<commit_message>
Updated documentation for use of the control panel
</commit_message>
<xml_diff>
--- a/docs/EquipmentSetup/OwlcmsCloud/CloudExplained.pptx
+++ b/docs/EquipmentSetup/OwlcmsCloud/CloudExplained.pptx
@@ -275,7 +275,7 @@
           <a:p>
             <a:fld id="{DFF2FBC3-E573-4B2D-B1C4-960EEBA08826}" type="datetimeFigureOut">
               <a:rPr lang="fr-CA" smtClean="0"/>
-              <a:t>2024-01-15</a:t>
+              <a:t>2025-01-11</a:t>
             </a:fld>
             <a:endParaRPr lang="fr-CA"/>
           </a:p>
@@ -475,7 +475,7 @@
           <a:p>
             <a:fld id="{DFF2FBC3-E573-4B2D-B1C4-960EEBA08826}" type="datetimeFigureOut">
               <a:rPr lang="fr-CA" smtClean="0"/>
-              <a:t>2024-01-15</a:t>
+              <a:t>2025-01-11</a:t>
             </a:fld>
             <a:endParaRPr lang="fr-CA"/>
           </a:p>
@@ -685,7 +685,7 @@
           <a:p>
             <a:fld id="{DFF2FBC3-E573-4B2D-B1C4-960EEBA08826}" type="datetimeFigureOut">
               <a:rPr lang="fr-CA" smtClean="0"/>
-              <a:t>2024-01-15</a:t>
+              <a:t>2025-01-11</a:t>
             </a:fld>
             <a:endParaRPr lang="fr-CA"/>
           </a:p>
@@ -885,7 +885,7 @@
           <a:p>
             <a:fld id="{DFF2FBC3-E573-4B2D-B1C4-960EEBA08826}" type="datetimeFigureOut">
               <a:rPr lang="fr-CA" smtClean="0"/>
-              <a:t>2024-01-15</a:t>
+              <a:t>2025-01-11</a:t>
             </a:fld>
             <a:endParaRPr lang="fr-CA"/>
           </a:p>
@@ -1161,7 +1161,7 @@
           <a:p>
             <a:fld id="{DFF2FBC3-E573-4B2D-B1C4-960EEBA08826}" type="datetimeFigureOut">
               <a:rPr lang="fr-CA" smtClean="0"/>
-              <a:t>2024-01-15</a:t>
+              <a:t>2025-01-11</a:t>
             </a:fld>
             <a:endParaRPr lang="fr-CA"/>
           </a:p>
@@ -1429,7 +1429,7 @@
           <a:p>
             <a:fld id="{DFF2FBC3-E573-4B2D-B1C4-960EEBA08826}" type="datetimeFigureOut">
               <a:rPr lang="fr-CA" smtClean="0"/>
-              <a:t>2024-01-15</a:t>
+              <a:t>2025-01-11</a:t>
             </a:fld>
             <a:endParaRPr lang="fr-CA"/>
           </a:p>
@@ -1844,7 +1844,7 @@
           <a:p>
             <a:fld id="{DFF2FBC3-E573-4B2D-B1C4-960EEBA08826}" type="datetimeFigureOut">
               <a:rPr lang="fr-CA" smtClean="0"/>
-              <a:t>2024-01-15</a:t>
+              <a:t>2025-01-11</a:t>
             </a:fld>
             <a:endParaRPr lang="fr-CA"/>
           </a:p>
@@ -1986,7 +1986,7 @@
           <a:p>
             <a:fld id="{DFF2FBC3-E573-4B2D-B1C4-960EEBA08826}" type="datetimeFigureOut">
               <a:rPr lang="fr-CA" smtClean="0"/>
-              <a:t>2024-01-15</a:t>
+              <a:t>2025-01-11</a:t>
             </a:fld>
             <a:endParaRPr lang="fr-CA"/>
           </a:p>
@@ -2099,7 +2099,7 @@
           <a:p>
             <a:fld id="{DFF2FBC3-E573-4B2D-B1C4-960EEBA08826}" type="datetimeFigureOut">
               <a:rPr lang="fr-CA" smtClean="0"/>
-              <a:t>2024-01-15</a:t>
+              <a:t>2025-01-11</a:t>
             </a:fld>
             <a:endParaRPr lang="fr-CA"/>
           </a:p>
@@ -2412,7 +2412,7 @@
           <a:p>
             <a:fld id="{DFF2FBC3-E573-4B2D-B1C4-960EEBA08826}" type="datetimeFigureOut">
               <a:rPr lang="fr-CA" smtClean="0"/>
-              <a:t>2024-01-15</a:t>
+              <a:t>2025-01-11</a:t>
             </a:fld>
             <a:endParaRPr lang="fr-CA"/>
           </a:p>
@@ -2701,7 +2701,7 @@
           <a:p>
             <a:fld id="{DFF2FBC3-E573-4B2D-B1C4-960EEBA08826}" type="datetimeFigureOut">
               <a:rPr lang="fr-CA" smtClean="0"/>
-              <a:t>2024-01-15</a:t>
+              <a:t>2025-01-11</a:t>
             </a:fld>
             <a:endParaRPr lang="fr-CA"/>
           </a:p>
@@ -2944,7 +2944,7 @@
           <a:p>
             <a:fld id="{DFF2FBC3-E573-4B2D-B1C4-960EEBA08826}" type="datetimeFigureOut">
               <a:rPr lang="fr-CA" smtClean="0"/>
-              <a:t>2024-01-15</a:t>
+              <a:t>2025-01-11</a:t>
             </a:fld>
             <a:endParaRPr lang="fr-CA"/>
           </a:p>
@@ -4626,12 +4626,271 @@
           </a:prstGeom>
         </p:spPr>
       </p:pic>
-      <p:sp>
-        <p:nvSpPr>
-          <p:cNvPr id="47" name="Graphic 45" descr="Cloud">
-            <a:extLst>
-              <a:ext uri="{FF2B5EF4-FFF2-40B4-BE49-F238E27FC236}">
-                <a16:creationId xmlns:a16="http://schemas.microsoft.com/office/drawing/2014/main" id="{2C50AF59-EF21-455C-ADD4-67B324FF4541}"/>
+      <p:cxnSp>
+        <p:nvCxnSpPr>
+          <p:cNvPr id="67" name="Connector: Curved 66">
+            <a:extLst>
+              <a:ext uri="{FF2B5EF4-FFF2-40B4-BE49-F238E27FC236}">
+                <a16:creationId xmlns:a16="http://schemas.microsoft.com/office/drawing/2014/main" id="{3CC4C0E7-8A33-456E-AB9A-19F7E746862F}"/>
+              </a:ext>
+            </a:extLst>
+          </p:cNvPr>
+          <p:cNvCxnSpPr>
+            <a:cxnSpLocks/>
+            <a:stCxn id="19" idx="2"/>
+          </p:cNvCxnSpPr>
+          <p:nvPr/>
+        </p:nvCxnSpPr>
+        <p:spPr>
+          <a:xfrm rot="16200000" flipH="1">
+            <a:off x="1891668" y="3208692"/>
+            <a:ext cx="844910" cy="965141"/>
+          </a:xfrm>
+          <a:prstGeom prst="curvedConnector2">
+            <a:avLst/>
+          </a:prstGeom>
+          <a:ln>
+            <a:headEnd type="triangle"/>
+            <a:tailEnd type="triangle"/>
+          </a:ln>
+        </p:spPr>
+        <p:style>
+          <a:lnRef idx="1">
+            <a:schemeClr val="accent1"/>
+          </a:lnRef>
+          <a:fillRef idx="0">
+            <a:schemeClr val="accent1"/>
+          </a:fillRef>
+          <a:effectRef idx="0">
+            <a:schemeClr val="accent1"/>
+          </a:effectRef>
+          <a:fontRef idx="minor">
+            <a:schemeClr val="tx1"/>
+          </a:fontRef>
+        </p:style>
+      </p:cxnSp>
+      <p:cxnSp>
+        <p:nvCxnSpPr>
+          <p:cNvPr id="69" name="Connector: Curved 68">
+            <a:extLst>
+              <a:ext uri="{FF2B5EF4-FFF2-40B4-BE49-F238E27FC236}">
+                <a16:creationId xmlns:a16="http://schemas.microsoft.com/office/drawing/2014/main" id="{B868B35F-7240-464D-8632-09E3BE0AA964}"/>
+              </a:ext>
+            </a:extLst>
+          </p:cNvPr>
+          <p:cNvCxnSpPr>
+            <a:cxnSpLocks/>
+            <a:stCxn id="18" idx="2"/>
+          </p:cNvCxnSpPr>
+          <p:nvPr/>
+        </p:nvCxnSpPr>
+        <p:spPr>
+          <a:xfrm rot="16200000" flipH="1">
+            <a:off x="1673297" y="2990321"/>
+            <a:ext cx="844910" cy="1401884"/>
+          </a:xfrm>
+          <a:prstGeom prst="curvedConnector2">
+            <a:avLst/>
+          </a:prstGeom>
+          <a:ln>
+            <a:headEnd type="triangle"/>
+            <a:tailEnd type="triangle"/>
+          </a:ln>
+        </p:spPr>
+        <p:style>
+          <a:lnRef idx="1">
+            <a:schemeClr val="accent1"/>
+          </a:lnRef>
+          <a:fillRef idx="0">
+            <a:schemeClr val="accent1"/>
+          </a:fillRef>
+          <a:effectRef idx="0">
+            <a:schemeClr val="accent1"/>
+          </a:effectRef>
+          <a:fontRef idx="minor">
+            <a:schemeClr val="tx1"/>
+          </a:fontRef>
+        </p:style>
+      </p:cxnSp>
+      <p:cxnSp>
+        <p:nvCxnSpPr>
+          <p:cNvPr id="71" name="Connector: Curved 70">
+            <a:extLst>
+              <a:ext uri="{FF2B5EF4-FFF2-40B4-BE49-F238E27FC236}">
+                <a16:creationId xmlns:a16="http://schemas.microsoft.com/office/drawing/2014/main" id="{F4029B8D-7D2F-4A22-8BE2-A243426A9C77}"/>
+              </a:ext>
+            </a:extLst>
+          </p:cNvPr>
+          <p:cNvCxnSpPr>
+            <a:cxnSpLocks/>
+            <a:stCxn id="15" idx="2"/>
+          </p:cNvCxnSpPr>
+          <p:nvPr/>
+        </p:nvCxnSpPr>
+        <p:spPr>
+          <a:xfrm rot="16200000" flipH="1">
+            <a:off x="1416101" y="2733125"/>
+            <a:ext cx="844910" cy="1916275"/>
+          </a:xfrm>
+          <a:prstGeom prst="curvedConnector2">
+            <a:avLst/>
+          </a:prstGeom>
+          <a:ln>
+            <a:headEnd type="triangle"/>
+            <a:tailEnd type="triangle"/>
+          </a:ln>
+        </p:spPr>
+        <p:style>
+          <a:lnRef idx="1">
+            <a:schemeClr val="accent1"/>
+          </a:lnRef>
+          <a:fillRef idx="0">
+            <a:schemeClr val="accent1"/>
+          </a:fillRef>
+          <a:effectRef idx="0">
+            <a:schemeClr val="accent1"/>
+          </a:effectRef>
+          <a:fontRef idx="minor">
+            <a:schemeClr val="tx1"/>
+          </a:fontRef>
+        </p:style>
+      </p:cxnSp>
+      <p:cxnSp>
+        <p:nvCxnSpPr>
+          <p:cNvPr id="76" name="Connector: Curved 75">
+            <a:extLst>
+              <a:ext uri="{FF2B5EF4-FFF2-40B4-BE49-F238E27FC236}">
+                <a16:creationId xmlns:a16="http://schemas.microsoft.com/office/drawing/2014/main" id="{B0E96370-52C4-45E3-ABB7-F38BD45E9E71}"/>
+              </a:ext>
+            </a:extLst>
+          </p:cNvPr>
+          <p:cNvCxnSpPr>
+            <a:cxnSpLocks/>
+          </p:cNvCxnSpPr>
+          <p:nvPr/>
+        </p:nvCxnSpPr>
+        <p:spPr>
+          <a:xfrm flipV="1">
+            <a:off x="1784372" y="4113718"/>
+            <a:ext cx="1012322" cy="417138"/>
+          </a:xfrm>
+          <a:prstGeom prst="curvedConnector3">
+            <a:avLst>
+              <a:gd name="adj1" fmla="val 50000"/>
+            </a:avLst>
+          </a:prstGeom>
+          <a:ln>
+            <a:headEnd type="triangle"/>
+            <a:tailEnd type="triangle"/>
+          </a:ln>
+        </p:spPr>
+        <p:style>
+          <a:lnRef idx="1">
+            <a:schemeClr val="accent1"/>
+          </a:lnRef>
+          <a:fillRef idx="0">
+            <a:schemeClr val="accent1"/>
+          </a:fillRef>
+          <a:effectRef idx="0">
+            <a:schemeClr val="accent1"/>
+          </a:effectRef>
+          <a:fontRef idx="minor">
+            <a:schemeClr val="tx1"/>
+          </a:fontRef>
+        </p:style>
+      </p:cxnSp>
+      <p:cxnSp>
+        <p:nvCxnSpPr>
+          <p:cNvPr id="121" name="Connector: Curved 120">
+            <a:extLst>
+              <a:ext uri="{FF2B5EF4-FFF2-40B4-BE49-F238E27FC236}">
+                <a16:creationId xmlns:a16="http://schemas.microsoft.com/office/drawing/2014/main" id="{7F9B236A-46B9-4CAA-9E1E-846355322AEF}"/>
+              </a:ext>
+            </a:extLst>
+          </p:cNvPr>
+          <p:cNvCxnSpPr>
+            <a:cxnSpLocks/>
+          </p:cNvCxnSpPr>
+          <p:nvPr/>
+        </p:nvCxnSpPr>
+        <p:spPr>
+          <a:xfrm rot="16200000" flipV="1">
+            <a:off x="1576356" y="2403359"/>
+            <a:ext cx="1909906" cy="716073"/>
+          </a:xfrm>
+          <a:prstGeom prst="curvedConnector3">
+            <a:avLst>
+              <a:gd name="adj1" fmla="val 68518"/>
+            </a:avLst>
+          </a:prstGeom>
+          <a:ln>
+            <a:tailEnd type="triangle"/>
+          </a:ln>
+        </p:spPr>
+        <p:style>
+          <a:lnRef idx="1">
+            <a:schemeClr val="accent1"/>
+          </a:lnRef>
+          <a:fillRef idx="0">
+            <a:schemeClr val="accent1"/>
+          </a:fillRef>
+          <a:effectRef idx="0">
+            <a:schemeClr val="accent1"/>
+          </a:effectRef>
+          <a:fontRef idx="minor">
+            <a:schemeClr val="tx1"/>
+          </a:fontRef>
+        </p:style>
+      </p:cxnSp>
+      <p:cxnSp>
+        <p:nvCxnSpPr>
+          <p:cNvPr id="124" name="Connector: Curved 123">
+            <a:extLst>
+              <a:ext uri="{FF2B5EF4-FFF2-40B4-BE49-F238E27FC236}">
+                <a16:creationId xmlns:a16="http://schemas.microsoft.com/office/drawing/2014/main" id="{53FE312B-72AD-4E57-A253-2FFF7B5C59D1}"/>
+              </a:ext>
+            </a:extLst>
+          </p:cNvPr>
+          <p:cNvCxnSpPr>
+            <a:cxnSpLocks/>
+          </p:cNvCxnSpPr>
+          <p:nvPr/>
+        </p:nvCxnSpPr>
+        <p:spPr>
+          <a:xfrm rot="16200000" flipV="1">
+            <a:off x="987418" y="1844098"/>
+            <a:ext cx="1950673" cy="1875367"/>
+          </a:xfrm>
+          <a:prstGeom prst="curvedConnector3">
+            <a:avLst>
+              <a:gd name="adj1" fmla="val 61940"/>
+            </a:avLst>
+          </a:prstGeom>
+          <a:ln>
+            <a:tailEnd type="triangle"/>
+          </a:ln>
+        </p:spPr>
+        <p:style>
+          <a:lnRef idx="1">
+            <a:schemeClr val="accent1"/>
+          </a:lnRef>
+          <a:fillRef idx="0">
+            <a:schemeClr val="accent1"/>
+          </a:fillRef>
+          <a:effectRef idx="0">
+            <a:schemeClr val="accent1"/>
+          </a:effectRef>
+          <a:fontRef idx="minor">
+            <a:schemeClr val="tx1"/>
+          </a:fontRef>
+        </p:style>
+      </p:cxnSp>
+      <p:sp>
+        <p:nvSpPr>
+          <p:cNvPr id="2" name="Rectangle 1">
+            <a:extLst>
+              <a:ext uri="{FF2B5EF4-FFF2-40B4-BE49-F238E27FC236}">
+                <a16:creationId xmlns:a16="http://schemas.microsoft.com/office/drawing/2014/main" id="{F5100FEA-6C24-1222-FB4A-4EF6532145B6}"/>
               </a:ext>
             </a:extLst>
           </p:cNvPr>
@@ -4640,8 +4899,1776 @@
         </p:nvSpPr>
         <p:spPr>
           <a:xfrm>
-            <a:off x="2631655" y="2653592"/>
-            <a:ext cx="3395921" cy="2321254"/>
+            <a:off x="298582" y="501110"/>
+            <a:ext cx="2219954" cy="5492108"/>
+          </a:xfrm>
+          <a:prstGeom prst="rect">
+            <a:avLst/>
+          </a:prstGeom>
+          <a:noFill/>
+        </p:spPr>
+        <p:style>
+          <a:lnRef idx="2">
+            <a:schemeClr val="accent1">
+              <a:shade val="50000"/>
+            </a:schemeClr>
+          </a:lnRef>
+          <a:fillRef idx="1">
+            <a:schemeClr val="accent1"/>
+          </a:fillRef>
+          <a:effectRef idx="0">
+            <a:schemeClr val="accent1"/>
+          </a:effectRef>
+          <a:fontRef idx="minor">
+            <a:schemeClr val="lt1"/>
+          </a:fontRef>
+        </p:style>
+        <p:txBody>
+          <a:bodyPr rtlCol="0" anchor="ctr"/>
+          <a:lstStyle/>
+          <a:p>
+            <a:pPr algn="ctr"/>
+            <a:endParaRPr lang="en-US" dirty="0"/>
+          </a:p>
+        </p:txBody>
+      </p:sp>
+      <p:sp>
+        <p:nvSpPr>
+          <p:cNvPr id="5" name="TextBox 4">
+            <a:extLst>
+              <a:ext uri="{FF2B5EF4-FFF2-40B4-BE49-F238E27FC236}">
+                <a16:creationId xmlns:a16="http://schemas.microsoft.com/office/drawing/2014/main" id="{E88597B3-9330-A16B-795F-4C465CAEF8C9}"/>
+              </a:ext>
+            </a:extLst>
+          </p:cNvPr>
+          <p:cNvSpPr txBox="1"/>
+          <p:nvPr/>
+        </p:nvSpPr>
+        <p:spPr>
+          <a:xfrm>
+            <a:off x="809016" y="2460195"/>
+            <a:ext cx="1110898" cy="369332"/>
+          </a:xfrm>
+          <a:prstGeom prst="rect">
+            <a:avLst/>
+          </a:prstGeom>
+          <a:noFill/>
+        </p:spPr>
+        <p:txBody>
+          <a:bodyPr wrap="square">
+            <a:spAutoFit/>
+          </a:bodyPr>
+          <a:lstStyle/>
+          <a:p>
+            <a:r>
+              <a:rPr lang="en-US" dirty="0"/>
+              <a:t>Referees</a:t>
+            </a:r>
+            <a:endParaRPr lang="en-CA" dirty="0"/>
+          </a:p>
+        </p:txBody>
+      </p:sp>
+      <p:sp>
+        <p:nvSpPr>
+          <p:cNvPr id="8" name="TextBox 7">
+            <a:extLst>
+              <a:ext uri="{FF2B5EF4-FFF2-40B4-BE49-F238E27FC236}">
+                <a16:creationId xmlns:a16="http://schemas.microsoft.com/office/drawing/2014/main" id="{3804DF01-C511-ED65-9989-F44F7AB2163E}"/>
+              </a:ext>
+            </a:extLst>
+          </p:cNvPr>
+          <p:cNvSpPr txBox="1"/>
+          <p:nvPr/>
+        </p:nvSpPr>
+        <p:spPr>
+          <a:xfrm>
+            <a:off x="2791526" y="4397978"/>
+            <a:ext cx="895502" cy="369332"/>
+          </a:xfrm>
+          <a:prstGeom prst="rect">
+            <a:avLst/>
+          </a:prstGeom>
+          <a:noFill/>
+        </p:spPr>
+        <p:txBody>
+          <a:bodyPr wrap="none" rtlCol="0">
+            <a:spAutoFit/>
+          </a:bodyPr>
+          <a:lstStyle/>
+          <a:p>
+            <a:r>
+              <a:rPr lang="en-US" dirty="0"/>
+              <a:t>owlcms</a:t>
+            </a:r>
+          </a:p>
+        </p:txBody>
+      </p:sp>
+      <p:sp>
+        <p:nvSpPr>
+          <p:cNvPr id="10" name="TextBox 9">
+            <a:extLst>
+              <a:ext uri="{FF2B5EF4-FFF2-40B4-BE49-F238E27FC236}">
+                <a16:creationId xmlns:a16="http://schemas.microsoft.com/office/drawing/2014/main" id="{EF31240E-65D8-199E-85D1-677B4950C62B}"/>
+              </a:ext>
+            </a:extLst>
+          </p:cNvPr>
+          <p:cNvSpPr txBox="1"/>
+          <p:nvPr/>
+        </p:nvSpPr>
+        <p:spPr>
+          <a:xfrm>
+            <a:off x="963286" y="5104505"/>
+            <a:ext cx="1220206" cy="369332"/>
+          </a:xfrm>
+          <a:prstGeom prst="rect">
+            <a:avLst/>
+          </a:prstGeom>
+          <a:noFill/>
+        </p:spPr>
+        <p:txBody>
+          <a:bodyPr wrap="none" rtlCol="0">
+            <a:spAutoFit/>
+          </a:bodyPr>
+          <a:lstStyle/>
+          <a:p>
+            <a:r>
+              <a:rPr lang="en-US" dirty="0"/>
+              <a:t>Announcer</a:t>
+            </a:r>
+          </a:p>
+        </p:txBody>
+      </p:sp>
+      <p:pic>
+        <p:nvPicPr>
+          <p:cNvPr id="11" name="Graphic 10" descr="Laptop">
+            <a:extLst>
+              <a:ext uri="{FF2B5EF4-FFF2-40B4-BE49-F238E27FC236}">
+                <a16:creationId xmlns:a16="http://schemas.microsoft.com/office/drawing/2014/main" id="{032C1AB0-6E58-5751-7C29-79736D414132}"/>
+              </a:ext>
+            </a:extLst>
+          </p:cNvPr>
+          <p:cNvPicPr>
+            <a:picLocks noChangeAspect="1"/>
+          </p:cNvPicPr>
+          <p:nvPr/>
+        </p:nvPicPr>
+        <p:blipFill>
+          <a:blip r:embed="rId4">
+            <a:extLst>
+              <a:ext uri="{28A0092B-C50C-407E-A947-70E740481C1C}">
+                <a14:useLocalDpi xmlns:a14="http://schemas.microsoft.com/office/drawing/2010/main" val="0"/>
+              </a:ext>
+              <a:ext uri="{96DAC541-7B7A-43D3-8B79-37D633B846F1}">
+                <asvg:svgBlip xmlns:asvg="http://schemas.microsoft.com/office/drawing/2016/SVG/main" r:embed="rId5"/>
+              </a:ext>
+            </a:extLst>
+          </a:blip>
+          <a:stretch>
+            <a:fillRect/>
+          </a:stretch>
+        </p:blipFill>
+        <p:spPr>
+          <a:xfrm>
+            <a:off x="1087711" y="4456043"/>
+            <a:ext cx="914400" cy="914400"/>
+          </a:xfrm>
+          <a:prstGeom prst="rect">
+            <a:avLst/>
+          </a:prstGeom>
+        </p:spPr>
+      </p:pic>
+      <p:sp>
+        <p:nvSpPr>
+          <p:cNvPr id="4" name="TextBox 3">
+            <a:extLst>
+              <a:ext uri="{FF2B5EF4-FFF2-40B4-BE49-F238E27FC236}">
+                <a16:creationId xmlns:a16="http://schemas.microsoft.com/office/drawing/2014/main" id="{12E2FA3B-EEE8-2FBB-5119-D4BBC41C4B96}"/>
+              </a:ext>
+            </a:extLst>
+          </p:cNvPr>
+          <p:cNvSpPr txBox="1"/>
+          <p:nvPr/>
+        </p:nvSpPr>
+        <p:spPr>
+          <a:xfrm>
+            <a:off x="285498" y="5617520"/>
+            <a:ext cx="2484016" cy="369332"/>
+          </a:xfrm>
+          <a:prstGeom prst="rect">
+            <a:avLst/>
+          </a:prstGeom>
+          <a:noFill/>
+        </p:spPr>
+        <p:txBody>
+          <a:bodyPr wrap="square" rtlCol="0">
+            <a:spAutoFit/>
+          </a:bodyPr>
+          <a:lstStyle/>
+          <a:p>
+            <a:r>
+              <a:rPr lang="en-US" i="1" dirty="0"/>
+              <a:t>Competition Site</a:t>
+            </a:r>
+          </a:p>
+        </p:txBody>
+      </p:sp>
+      <p:pic>
+        <p:nvPicPr>
+          <p:cNvPr id="13" name="Graphic 12" descr="Laptop">
+            <a:extLst>
+              <a:ext uri="{FF2B5EF4-FFF2-40B4-BE49-F238E27FC236}">
+                <a16:creationId xmlns:a16="http://schemas.microsoft.com/office/drawing/2014/main" id="{77D50B0C-A067-74C7-6962-7CFB05FEE07B}"/>
+              </a:ext>
+            </a:extLst>
+          </p:cNvPr>
+          <p:cNvPicPr>
+            <a:picLocks noChangeAspect="1"/>
+          </p:cNvPicPr>
+          <p:nvPr/>
+        </p:nvPicPr>
+        <p:blipFill>
+          <a:blip r:embed="rId6">
+            <a:extLst>
+              <a:ext uri="{28A0092B-C50C-407E-A947-70E740481C1C}">
+                <a14:useLocalDpi xmlns:a14="http://schemas.microsoft.com/office/drawing/2010/main" val="0"/>
+              </a:ext>
+              <a:ext uri="{96DAC541-7B7A-43D3-8B79-37D633B846F1}">
+                <asvg:svgBlip xmlns:asvg="http://schemas.microsoft.com/office/drawing/2016/SVG/main" r:embed="rId7"/>
+              </a:ext>
+            </a:extLst>
+          </a:blip>
+          <a:stretch>
+            <a:fillRect/>
+          </a:stretch>
+        </p:blipFill>
+        <p:spPr>
+          <a:xfrm>
+            <a:off x="418575" y="921360"/>
+            <a:ext cx="914400" cy="914400"/>
+          </a:xfrm>
+          <a:prstGeom prst="rect">
+            <a:avLst/>
+          </a:prstGeom>
+        </p:spPr>
+      </p:pic>
+      <p:pic>
+        <p:nvPicPr>
+          <p:cNvPr id="14" name="Graphic 13" descr="Laptop">
+            <a:extLst>
+              <a:ext uri="{FF2B5EF4-FFF2-40B4-BE49-F238E27FC236}">
+                <a16:creationId xmlns:a16="http://schemas.microsoft.com/office/drawing/2014/main" id="{D289C601-50FF-702F-4773-41130CA27D58}"/>
+              </a:ext>
+            </a:extLst>
+          </p:cNvPr>
+          <p:cNvPicPr>
+            <a:picLocks noChangeAspect="1"/>
+          </p:cNvPicPr>
+          <p:nvPr/>
+        </p:nvPicPr>
+        <p:blipFill>
+          <a:blip r:embed="rId6">
+            <a:extLst>
+              <a:ext uri="{28A0092B-C50C-407E-A947-70E740481C1C}">
+                <a14:useLocalDpi xmlns:a14="http://schemas.microsoft.com/office/drawing/2010/main" val="0"/>
+              </a:ext>
+              <a:ext uri="{96DAC541-7B7A-43D3-8B79-37D633B846F1}">
+                <asvg:svgBlip xmlns:asvg="http://schemas.microsoft.com/office/drawing/2016/SVG/main" r:embed="rId7"/>
+              </a:ext>
+            </a:extLst>
+          </a:blip>
+          <a:stretch>
+            <a:fillRect/>
+          </a:stretch>
+        </p:blipFill>
+        <p:spPr>
+          <a:xfrm>
+            <a:off x="1573858" y="926226"/>
+            <a:ext cx="914400" cy="914400"/>
+          </a:xfrm>
+          <a:prstGeom prst="rect">
+            <a:avLst/>
+          </a:prstGeom>
+        </p:spPr>
+      </p:pic>
+      <p:sp>
+        <p:nvSpPr>
+          <p:cNvPr id="16" name="TextBox 15">
+            <a:extLst>
+              <a:ext uri="{FF2B5EF4-FFF2-40B4-BE49-F238E27FC236}">
+                <a16:creationId xmlns:a16="http://schemas.microsoft.com/office/drawing/2014/main" id="{C86FB194-B2DD-3F2F-F889-A078DD93B5DA}"/>
+              </a:ext>
+            </a:extLst>
+          </p:cNvPr>
+          <p:cNvSpPr txBox="1"/>
+          <p:nvPr/>
+        </p:nvSpPr>
+        <p:spPr>
+          <a:xfrm>
+            <a:off x="1027765" y="766481"/>
+            <a:ext cx="942887" cy="369332"/>
+          </a:xfrm>
+          <a:prstGeom prst="rect">
+            <a:avLst/>
+          </a:prstGeom>
+          <a:noFill/>
+        </p:spPr>
+        <p:txBody>
+          <a:bodyPr wrap="none" rtlCol="0">
+            <a:spAutoFit/>
+          </a:bodyPr>
+          <a:lstStyle/>
+          <a:p>
+            <a:r>
+              <a:rPr lang="en-US" dirty="0"/>
+              <a:t>Displays</a:t>
+            </a:r>
+          </a:p>
+        </p:txBody>
+      </p:sp>
+      <p:pic>
+        <p:nvPicPr>
+          <p:cNvPr id="7" name="Graphic 6" descr="Database with solid fill">
+            <a:extLst>
+              <a:ext uri="{FF2B5EF4-FFF2-40B4-BE49-F238E27FC236}">
+                <a16:creationId xmlns:a16="http://schemas.microsoft.com/office/drawing/2014/main" id="{4BD98B12-7BC5-37AB-D5EF-9E9CE5434F60}"/>
+              </a:ext>
+            </a:extLst>
+          </p:cNvPr>
+          <p:cNvPicPr>
+            <a:picLocks noChangeAspect="1"/>
+          </p:cNvPicPr>
+          <p:nvPr/>
+        </p:nvPicPr>
+        <p:blipFill>
+          <a:blip r:embed="rId8">
+            <a:extLst>
+              <a:ext uri="{96DAC541-7B7A-43D3-8B79-37D633B846F1}">
+                <asvg:svgBlip xmlns:asvg="http://schemas.microsoft.com/office/drawing/2016/SVG/main" r:embed="rId9"/>
+              </a:ext>
+            </a:extLst>
+          </a:blip>
+          <a:stretch>
+            <a:fillRect/>
+          </a:stretch>
+        </p:blipFill>
+        <p:spPr>
+          <a:xfrm>
+            <a:off x="2663189" y="3584177"/>
+            <a:ext cx="914400" cy="914400"/>
+          </a:xfrm>
+          <a:prstGeom prst="rect">
+            <a:avLst/>
+          </a:prstGeom>
+        </p:spPr>
+      </p:pic>
+      <p:pic>
+        <p:nvPicPr>
+          <p:cNvPr id="17" name="Graphic 16" descr="Lightning bolt with solid fill">
+            <a:extLst>
+              <a:ext uri="{FF2B5EF4-FFF2-40B4-BE49-F238E27FC236}">
+                <a16:creationId xmlns:a16="http://schemas.microsoft.com/office/drawing/2014/main" id="{9EEBFDB2-8BD1-B3DA-3F39-C87A4F152D0E}"/>
+              </a:ext>
+            </a:extLst>
+          </p:cNvPr>
+          <p:cNvPicPr>
+            <a:picLocks noChangeAspect="1"/>
+          </p:cNvPicPr>
+          <p:nvPr/>
+        </p:nvPicPr>
+        <p:blipFill>
+          <a:blip r:embed="rId10">
+            <a:extLst>
+              <a:ext uri="{96DAC541-7B7A-43D3-8B79-37D633B846F1}">
+                <asvg:svgBlip xmlns:asvg="http://schemas.microsoft.com/office/drawing/2016/SVG/main" r:embed="rId11"/>
+              </a:ext>
+            </a:extLst>
+          </a:blip>
+          <a:stretch>
+            <a:fillRect/>
+          </a:stretch>
+        </p:blipFill>
+        <p:spPr>
+          <a:xfrm>
+            <a:off x="5638800" y="2971800"/>
+            <a:ext cx="914400" cy="914400"/>
+          </a:xfrm>
+          <a:prstGeom prst="rect">
+            <a:avLst/>
+          </a:prstGeom>
+        </p:spPr>
+      </p:pic>
+      <p:grpSp>
+        <p:nvGrpSpPr>
+          <p:cNvPr id="26" name="Group 25">
+            <a:extLst>
+              <a:ext uri="{FF2B5EF4-FFF2-40B4-BE49-F238E27FC236}">
+                <a16:creationId xmlns:a16="http://schemas.microsoft.com/office/drawing/2014/main" id="{211D668F-7AEE-05A0-67DB-515348CF42B3}"/>
+              </a:ext>
+            </a:extLst>
+          </p:cNvPr>
+          <p:cNvGrpSpPr/>
+          <p:nvPr/>
+        </p:nvGrpSpPr>
+        <p:grpSpPr>
+          <a:xfrm>
+            <a:off x="9115425" y="1419224"/>
+            <a:ext cx="499986" cy="416535"/>
+            <a:chOff x="7369930" y="3989005"/>
+            <a:chExt cx="647700" cy="438150"/>
+          </a:xfrm>
+        </p:grpSpPr>
+        <p:sp>
+          <p:nvSpPr>
+            <p:cNvPr id="23" name="Freeform: Shape 22">
+              <a:extLst>
+                <a:ext uri="{FF2B5EF4-FFF2-40B4-BE49-F238E27FC236}">
+                  <a16:creationId xmlns:a16="http://schemas.microsoft.com/office/drawing/2014/main" id="{72E0A763-64C4-1230-D8D1-533E3094EEA2}"/>
+                </a:ext>
+              </a:extLst>
+            </p:cNvPr>
+            <p:cNvSpPr/>
+            <p:nvPr/>
+          </p:nvSpPr>
+          <p:spPr>
+            <a:xfrm>
+              <a:off x="7369930" y="3989005"/>
+              <a:ext cx="647700" cy="438150"/>
+            </a:xfrm>
+            <a:custGeom>
+              <a:avLst/>
+              <a:gdLst>
+                <a:gd name="connsiteX0" fmla="*/ 590550 w 647700"/>
+                <a:gd name="connsiteY0" fmla="*/ 381000 h 438150"/>
+                <a:gd name="connsiteX1" fmla="*/ 57150 w 647700"/>
+                <a:gd name="connsiteY1" fmla="*/ 381000 h 438150"/>
+                <a:gd name="connsiteX2" fmla="*/ 57150 w 647700"/>
+                <a:gd name="connsiteY2" fmla="*/ 57150 h 438150"/>
+                <a:gd name="connsiteX3" fmla="*/ 590550 w 647700"/>
+                <a:gd name="connsiteY3" fmla="*/ 57150 h 438150"/>
+                <a:gd name="connsiteX4" fmla="*/ 647700 w 647700"/>
+                <a:gd name="connsiteY4" fmla="*/ 38100 h 438150"/>
+                <a:gd name="connsiteX5" fmla="*/ 609600 w 647700"/>
+                <a:gd name="connsiteY5" fmla="*/ 0 h 438150"/>
+                <a:gd name="connsiteX6" fmla="*/ 38100 w 647700"/>
+                <a:gd name="connsiteY6" fmla="*/ 0 h 438150"/>
+                <a:gd name="connsiteX7" fmla="*/ 0 w 647700"/>
+                <a:gd name="connsiteY7" fmla="*/ 38100 h 438150"/>
+                <a:gd name="connsiteX8" fmla="*/ 0 w 647700"/>
+                <a:gd name="connsiteY8" fmla="*/ 438150 h 438150"/>
+                <a:gd name="connsiteX9" fmla="*/ 647700 w 647700"/>
+                <a:gd name="connsiteY9" fmla="*/ 438150 h 438150"/>
+              </a:gdLst>
+              <a:ahLst/>
+              <a:cxnLst>
+                <a:cxn ang="0">
+                  <a:pos x="connsiteX0" y="connsiteY0"/>
+                </a:cxn>
+                <a:cxn ang="0">
+                  <a:pos x="connsiteX1" y="connsiteY1"/>
+                </a:cxn>
+                <a:cxn ang="0">
+                  <a:pos x="connsiteX2" y="connsiteY2"/>
+                </a:cxn>
+                <a:cxn ang="0">
+                  <a:pos x="connsiteX3" y="connsiteY3"/>
+                </a:cxn>
+                <a:cxn ang="0">
+                  <a:pos x="connsiteX4" y="connsiteY4"/>
+                </a:cxn>
+                <a:cxn ang="0">
+                  <a:pos x="connsiteX5" y="connsiteY5"/>
+                </a:cxn>
+                <a:cxn ang="0">
+                  <a:pos x="connsiteX6" y="connsiteY6"/>
+                </a:cxn>
+                <a:cxn ang="0">
+                  <a:pos x="connsiteX7" y="connsiteY7"/>
+                </a:cxn>
+                <a:cxn ang="0">
+                  <a:pos x="connsiteX8" y="connsiteY8"/>
+                </a:cxn>
+                <a:cxn ang="0">
+                  <a:pos x="connsiteX9" y="connsiteY9"/>
+                </a:cxn>
+              </a:cxnLst>
+              <a:rect l="l" t="t" r="r" b="b"/>
+              <a:pathLst>
+                <a:path w="647700" h="438150">
+                  <a:moveTo>
+                    <a:pt x="590550" y="381000"/>
+                  </a:moveTo>
+                  <a:lnTo>
+                    <a:pt x="57150" y="381000"/>
+                  </a:lnTo>
+                  <a:lnTo>
+                    <a:pt x="57150" y="57150"/>
+                  </a:lnTo>
+                  <a:lnTo>
+                    <a:pt x="590550" y="57150"/>
+                  </a:lnTo>
+                  <a:close/>
+                  <a:moveTo>
+                    <a:pt x="647700" y="38100"/>
+                  </a:moveTo>
+                  <a:cubicBezTo>
+                    <a:pt x="647700" y="17058"/>
+                    <a:pt x="630642" y="0"/>
+                    <a:pt x="609600" y="0"/>
+                  </a:cubicBezTo>
+                  <a:lnTo>
+                    <a:pt x="38100" y="0"/>
+                  </a:lnTo>
+                  <a:cubicBezTo>
+                    <a:pt x="17058" y="0"/>
+                    <a:pt x="0" y="17058"/>
+                    <a:pt x="0" y="38100"/>
+                  </a:cubicBezTo>
+                  <a:lnTo>
+                    <a:pt x="0" y="438150"/>
+                  </a:lnTo>
+                  <a:lnTo>
+                    <a:pt x="647700" y="438150"/>
+                  </a:lnTo>
+                  <a:close/>
+                </a:path>
+              </a:pathLst>
+            </a:custGeom>
+            <a:solidFill>
+              <a:srgbClr val="000000"/>
+            </a:solidFill>
+            <a:ln w="9525" cap="flat">
+              <a:noFill/>
+              <a:prstDash val="solid"/>
+              <a:miter/>
+            </a:ln>
+          </p:spPr>
+          <p:txBody>
+            <a:bodyPr rtlCol="0" anchor="ctr"/>
+            <a:lstStyle/>
+            <a:p>
+              <a:endParaRPr lang="en-CA"/>
+            </a:p>
+          </p:txBody>
+        </p:sp>
+        <p:sp>
+          <p:nvSpPr>
+            <p:cNvPr id="25" name="Freeform: Shape 24">
+              <a:extLst>
+                <a:ext uri="{FF2B5EF4-FFF2-40B4-BE49-F238E27FC236}">
+                  <a16:creationId xmlns:a16="http://schemas.microsoft.com/office/drawing/2014/main" id="{522C0F4C-0647-0081-DEB8-5BA6A57ED92D}"/>
+                </a:ext>
+              </a:extLst>
+            </p:cNvPr>
+            <p:cNvSpPr/>
+            <p:nvPr/>
+          </p:nvSpPr>
+          <p:spPr>
+            <a:xfrm>
+              <a:off x="7560430" y="4074730"/>
+              <a:ext cx="266700" cy="266700"/>
+            </a:xfrm>
+            <a:custGeom>
+              <a:avLst/>
+              <a:gdLst>
+                <a:gd name="connsiteX0" fmla="*/ 133350 w 266700"/>
+                <a:gd name="connsiteY0" fmla="*/ 0 h 266700"/>
+                <a:gd name="connsiteX1" fmla="*/ 0 w 266700"/>
+                <a:gd name="connsiteY1" fmla="*/ 133350 h 266700"/>
+                <a:gd name="connsiteX2" fmla="*/ 133350 w 266700"/>
+                <a:gd name="connsiteY2" fmla="*/ 266700 h 266700"/>
+                <a:gd name="connsiteX3" fmla="*/ 266700 w 266700"/>
+                <a:gd name="connsiteY3" fmla="*/ 133350 h 266700"/>
+                <a:gd name="connsiteX4" fmla="*/ 133350 w 266700"/>
+                <a:gd name="connsiteY4" fmla="*/ 0 h 266700"/>
+                <a:gd name="connsiteX5" fmla="*/ 142875 w 266700"/>
+                <a:gd name="connsiteY5" fmla="*/ 142875 h 266700"/>
+                <a:gd name="connsiteX6" fmla="*/ 186595 w 266700"/>
+                <a:gd name="connsiteY6" fmla="*/ 142875 h 266700"/>
+                <a:gd name="connsiteX7" fmla="*/ 142875 w 266700"/>
+                <a:gd name="connsiteY7" fmla="*/ 229648 h 266700"/>
+                <a:gd name="connsiteX8" fmla="*/ 142875 w 266700"/>
+                <a:gd name="connsiteY8" fmla="*/ 123825 h 266700"/>
+                <a:gd name="connsiteX9" fmla="*/ 142875 w 266700"/>
+                <a:gd name="connsiteY9" fmla="*/ 36957 h 266700"/>
+                <a:gd name="connsiteX10" fmla="*/ 186595 w 266700"/>
+                <a:gd name="connsiteY10" fmla="*/ 123825 h 266700"/>
+                <a:gd name="connsiteX11" fmla="*/ 123825 w 266700"/>
+                <a:gd name="connsiteY11" fmla="*/ 123825 h 266700"/>
+                <a:gd name="connsiteX12" fmla="*/ 81534 w 266700"/>
+                <a:gd name="connsiteY12" fmla="*/ 123825 h 266700"/>
+                <a:gd name="connsiteX13" fmla="*/ 123825 w 266700"/>
+                <a:gd name="connsiteY13" fmla="*/ 38100 h 266700"/>
+                <a:gd name="connsiteX14" fmla="*/ 123825 w 266700"/>
+                <a:gd name="connsiteY14" fmla="*/ 142875 h 266700"/>
+                <a:gd name="connsiteX15" fmla="*/ 123825 w 266700"/>
+                <a:gd name="connsiteY15" fmla="*/ 228600 h 266700"/>
+                <a:gd name="connsiteX16" fmla="*/ 81534 w 266700"/>
+                <a:gd name="connsiteY16" fmla="*/ 142875 h 266700"/>
+                <a:gd name="connsiteX17" fmla="*/ 62389 w 266700"/>
+                <a:gd name="connsiteY17" fmla="*/ 123825 h 266700"/>
+                <a:gd name="connsiteX18" fmla="*/ 21622 w 266700"/>
+                <a:gd name="connsiteY18" fmla="*/ 123825 h 266700"/>
+                <a:gd name="connsiteX19" fmla="*/ 111824 w 266700"/>
+                <a:gd name="connsiteY19" fmla="*/ 23336 h 266700"/>
+                <a:gd name="connsiteX20" fmla="*/ 62389 w 266700"/>
+                <a:gd name="connsiteY20" fmla="*/ 123825 h 266700"/>
+                <a:gd name="connsiteX21" fmla="*/ 62389 w 266700"/>
+                <a:gd name="connsiteY21" fmla="*/ 142875 h 266700"/>
+                <a:gd name="connsiteX22" fmla="*/ 112014 w 266700"/>
+                <a:gd name="connsiteY22" fmla="*/ 243459 h 266700"/>
+                <a:gd name="connsiteX23" fmla="*/ 21622 w 266700"/>
+                <a:gd name="connsiteY23" fmla="*/ 142875 h 266700"/>
+                <a:gd name="connsiteX24" fmla="*/ 205740 w 266700"/>
+                <a:gd name="connsiteY24" fmla="*/ 142875 h 266700"/>
+                <a:gd name="connsiteX25" fmla="*/ 245078 w 266700"/>
+                <a:gd name="connsiteY25" fmla="*/ 142875 h 266700"/>
+                <a:gd name="connsiteX26" fmla="*/ 156400 w 266700"/>
+                <a:gd name="connsiteY26" fmla="*/ 243078 h 266700"/>
+                <a:gd name="connsiteX27" fmla="*/ 205740 w 266700"/>
+                <a:gd name="connsiteY27" fmla="*/ 142875 h 266700"/>
+                <a:gd name="connsiteX28" fmla="*/ 205740 w 266700"/>
+                <a:gd name="connsiteY28" fmla="*/ 123825 h 266700"/>
+                <a:gd name="connsiteX29" fmla="*/ 156686 w 266700"/>
+                <a:gd name="connsiteY29" fmla="*/ 23717 h 266700"/>
+                <a:gd name="connsiteX30" fmla="*/ 245078 w 266700"/>
+                <a:gd name="connsiteY30" fmla="*/ 123825 h 266700"/>
+              </a:gdLst>
+              <a:ahLst/>
+              <a:cxnLst>
+                <a:cxn ang="0">
+                  <a:pos x="connsiteX0" y="connsiteY0"/>
+                </a:cxn>
+                <a:cxn ang="0">
+                  <a:pos x="connsiteX1" y="connsiteY1"/>
+                </a:cxn>
+                <a:cxn ang="0">
+                  <a:pos x="connsiteX2" y="connsiteY2"/>
+                </a:cxn>
+                <a:cxn ang="0">
+                  <a:pos x="connsiteX3" y="connsiteY3"/>
+                </a:cxn>
+                <a:cxn ang="0">
+                  <a:pos x="connsiteX4" y="connsiteY4"/>
+                </a:cxn>
+                <a:cxn ang="0">
+                  <a:pos x="connsiteX5" y="connsiteY5"/>
+                </a:cxn>
+                <a:cxn ang="0">
+                  <a:pos x="connsiteX6" y="connsiteY6"/>
+                </a:cxn>
+                <a:cxn ang="0">
+                  <a:pos x="connsiteX7" y="connsiteY7"/>
+                </a:cxn>
+                <a:cxn ang="0">
+                  <a:pos x="connsiteX8" y="connsiteY8"/>
+                </a:cxn>
+                <a:cxn ang="0">
+                  <a:pos x="connsiteX9" y="connsiteY9"/>
+                </a:cxn>
+                <a:cxn ang="0">
+                  <a:pos x="connsiteX10" y="connsiteY10"/>
+                </a:cxn>
+                <a:cxn ang="0">
+                  <a:pos x="connsiteX11" y="connsiteY11"/>
+                </a:cxn>
+                <a:cxn ang="0">
+                  <a:pos x="connsiteX12" y="connsiteY12"/>
+                </a:cxn>
+                <a:cxn ang="0">
+                  <a:pos x="connsiteX13" y="connsiteY13"/>
+                </a:cxn>
+                <a:cxn ang="0">
+                  <a:pos x="connsiteX14" y="connsiteY14"/>
+                </a:cxn>
+                <a:cxn ang="0">
+                  <a:pos x="connsiteX15" y="connsiteY15"/>
+                </a:cxn>
+                <a:cxn ang="0">
+                  <a:pos x="connsiteX16" y="connsiteY16"/>
+                </a:cxn>
+                <a:cxn ang="0">
+                  <a:pos x="connsiteX17" y="connsiteY17"/>
+                </a:cxn>
+                <a:cxn ang="0">
+                  <a:pos x="connsiteX18" y="connsiteY18"/>
+                </a:cxn>
+                <a:cxn ang="0">
+                  <a:pos x="connsiteX19" y="connsiteY19"/>
+                </a:cxn>
+                <a:cxn ang="0">
+                  <a:pos x="connsiteX20" y="connsiteY20"/>
+                </a:cxn>
+                <a:cxn ang="0">
+                  <a:pos x="connsiteX21" y="connsiteY21"/>
+                </a:cxn>
+                <a:cxn ang="0">
+                  <a:pos x="connsiteX22" y="connsiteY22"/>
+                </a:cxn>
+                <a:cxn ang="0">
+                  <a:pos x="connsiteX23" y="connsiteY23"/>
+                </a:cxn>
+                <a:cxn ang="0">
+                  <a:pos x="connsiteX24" y="connsiteY24"/>
+                </a:cxn>
+                <a:cxn ang="0">
+                  <a:pos x="connsiteX25" y="connsiteY25"/>
+                </a:cxn>
+                <a:cxn ang="0">
+                  <a:pos x="connsiteX26" y="connsiteY26"/>
+                </a:cxn>
+                <a:cxn ang="0">
+                  <a:pos x="connsiteX27" y="connsiteY27"/>
+                </a:cxn>
+                <a:cxn ang="0">
+                  <a:pos x="connsiteX28" y="connsiteY28"/>
+                </a:cxn>
+                <a:cxn ang="0">
+                  <a:pos x="connsiteX29" y="connsiteY29"/>
+                </a:cxn>
+                <a:cxn ang="0">
+                  <a:pos x="connsiteX30" y="connsiteY30"/>
+                </a:cxn>
+              </a:cxnLst>
+              <a:rect l="l" t="t" r="r" b="b"/>
+              <a:pathLst>
+                <a:path w="266700" h="266700">
+                  <a:moveTo>
+                    <a:pt x="133350" y="0"/>
+                  </a:moveTo>
+                  <a:cubicBezTo>
+                    <a:pt x="59703" y="0"/>
+                    <a:pt x="0" y="59703"/>
+                    <a:pt x="0" y="133350"/>
+                  </a:cubicBezTo>
+                  <a:cubicBezTo>
+                    <a:pt x="0" y="206997"/>
+                    <a:pt x="59703" y="266700"/>
+                    <a:pt x="133350" y="266700"/>
+                  </a:cubicBezTo>
+                  <a:cubicBezTo>
+                    <a:pt x="206997" y="266700"/>
+                    <a:pt x="266700" y="206997"/>
+                    <a:pt x="266700" y="133350"/>
+                  </a:cubicBezTo>
+                  <a:cubicBezTo>
+                    <a:pt x="266700" y="59703"/>
+                    <a:pt x="206997" y="0"/>
+                    <a:pt x="133350" y="0"/>
+                  </a:cubicBezTo>
+                  <a:close/>
+                  <a:moveTo>
+                    <a:pt x="142875" y="142875"/>
+                  </a:moveTo>
+                  <a:lnTo>
+                    <a:pt x="186595" y="142875"/>
+                  </a:lnTo>
+                  <a:cubicBezTo>
+                    <a:pt x="181616" y="175711"/>
+                    <a:pt x="166302" y="206107"/>
+                    <a:pt x="142875" y="229648"/>
+                  </a:cubicBezTo>
+                  <a:close/>
+                  <a:moveTo>
+                    <a:pt x="142875" y="123825"/>
+                  </a:moveTo>
+                  <a:lnTo>
+                    <a:pt x="142875" y="36957"/>
+                  </a:lnTo>
+                  <a:cubicBezTo>
+                    <a:pt x="166326" y="60520"/>
+                    <a:pt x="181642" y="90952"/>
+                    <a:pt x="186595" y="123825"/>
+                  </a:cubicBezTo>
+                  <a:close/>
+                  <a:moveTo>
+                    <a:pt x="123825" y="123825"/>
+                  </a:moveTo>
+                  <a:lnTo>
+                    <a:pt x="81534" y="123825"/>
+                  </a:lnTo>
+                  <a:cubicBezTo>
+                    <a:pt x="86271" y="91515"/>
+                    <a:pt x="101069" y="61520"/>
+                    <a:pt x="123825" y="38100"/>
+                  </a:cubicBezTo>
+                  <a:close/>
+                  <a:moveTo>
+                    <a:pt x="123825" y="142875"/>
+                  </a:moveTo>
+                  <a:lnTo>
+                    <a:pt x="123825" y="228600"/>
+                  </a:lnTo>
+                  <a:cubicBezTo>
+                    <a:pt x="101112" y="205149"/>
+                    <a:pt x="86320" y="175170"/>
+                    <a:pt x="81534" y="142875"/>
+                  </a:cubicBezTo>
+                  <a:close/>
+                  <a:moveTo>
+                    <a:pt x="62389" y="123825"/>
+                  </a:moveTo>
+                  <a:lnTo>
+                    <a:pt x="21622" y="123825"/>
+                  </a:lnTo>
+                  <a:cubicBezTo>
+                    <a:pt x="25850" y="73933"/>
+                    <a:pt x="62676" y="32908"/>
+                    <a:pt x="111824" y="23336"/>
+                  </a:cubicBezTo>
+                  <a:cubicBezTo>
+                    <a:pt x="84670" y="50432"/>
+                    <a:pt x="67282" y="85777"/>
+                    <a:pt x="62389" y="123825"/>
+                  </a:cubicBezTo>
+                  <a:close/>
+                  <a:moveTo>
+                    <a:pt x="62389" y="142875"/>
+                  </a:moveTo>
+                  <a:cubicBezTo>
+                    <a:pt x="67286" y="180988"/>
+                    <a:pt x="84748" y="216382"/>
+                    <a:pt x="112014" y="243459"/>
+                  </a:cubicBezTo>
+                  <a:cubicBezTo>
+                    <a:pt x="62794" y="233894"/>
+                    <a:pt x="25894" y="192834"/>
+                    <a:pt x="21622" y="142875"/>
+                  </a:cubicBezTo>
+                  <a:close/>
+                  <a:moveTo>
+                    <a:pt x="205740" y="142875"/>
+                  </a:moveTo>
+                  <a:lnTo>
+                    <a:pt x="245078" y="142875"/>
+                  </a:lnTo>
+                  <a:cubicBezTo>
+                    <a:pt x="240907" y="192201"/>
+                    <a:pt x="204854" y="232941"/>
+                    <a:pt x="156400" y="243078"/>
+                  </a:cubicBezTo>
+                  <a:cubicBezTo>
+                    <a:pt x="183540" y="216099"/>
+                    <a:pt x="200903" y="180836"/>
+                    <a:pt x="205740" y="142875"/>
+                  </a:cubicBezTo>
+                  <a:close/>
+                  <a:moveTo>
+                    <a:pt x="205740" y="123825"/>
+                  </a:moveTo>
+                  <a:cubicBezTo>
+                    <a:pt x="200864" y="85963"/>
+                    <a:pt x="183619" y="50771"/>
+                    <a:pt x="156686" y="23717"/>
+                  </a:cubicBezTo>
+                  <a:cubicBezTo>
+                    <a:pt x="204996" y="33955"/>
+                    <a:pt x="240902" y="74620"/>
+                    <a:pt x="245078" y="123825"/>
+                  </a:cubicBezTo>
+                  <a:close/>
+                </a:path>
+              </a:pathLst>
+            </a:custGeom>
+            <a:solidFill>
+              <a:srgbClr val="000000"/>
+            </a:solidFill>
+            <a:ln w="9525" cap="flat">
+              <a:noFill/>
+              <a:prstDash val="solid"/>
+              <a:miter/>
+            </a:ln>
+          </p:spPr>
+          <p:txBody>
+            <a:bodyPr rtlCol="0" anchor="ctr"/>
+            <a:lstStyle/>
+            <a:p>
+              <a:endParaRPr lang="en-CA"/>
+            </a:p>
+          </p:txBody>
+        </p:sp>
+      </p:grpSp>
+      <p:pic>
+        <p:nvPicPr>
+          <p:cNvPr id="28" name="Graphic 27" descr="Checklist with solid fill">
+            <a:extLst>
+              <a:ext uri="{FF2B5EF4-FFF2-40B4-BE49-F238E27FC236}">
+                <a16:creationId xmlns:a16="http://schemas.microsoft.com/office/drawing/2014/main" id="{4806FA09-6DFB-C187-6775-7FD7E2686E94}"/>
+              </a:ext>
+            </a:extLst>
+          </p:cNvPr>
+          <p:cNvPicPr>
+            <a:picLocks noChangeAspect="1"/>
+          </p:cNvPicPr>
+          <p:nvPr/>
+        </p:nvPicPr>
+        <p:blipFill>
+          <a:blip r:embed="rId12">
+            <a:extLst>
+              <a:ext uri="{96DAC541-7B7A-43D3-8B79-37D633B846F1}">
+                <asvg:svgBlip xmlns:asvg="http://schemas.microsoft.com/office/drawing/2016/SVG/main" r:embed="rId13"/>
+              </a:ext>
+            </a:extLst>
+          </a:blip>
+          <a:stretch>
+            <a:fillRect/>
+          </a:stretch>
+        </p:blipFill>
+        <p:spPr>
+          <a:xfrm>
+            <a:off x="8834361" y="3614301"/>
+            <a:ext cx="914400" cy="914400"/>
+          </a:xfrm>
+          <a:prstGeom prst="rect">
+            <a:avLst/>
+          </a:prstGeom>
+        </p:spPr>
+      </p:pic>
+    </p:spTree>
+    <p:extLst>
+      <p:ext uri="{BB962C8B-B14F-4D97-AF65-F5344CB8AC3E}">
+        <p14:creationId xmlns:p14="http://schemas.microsoft.com/office/powerpoint/2010/main" val="2097706456"/>
+      </p:ext>
+    </p:extLst>
+  </p:cSld>
+  <p:clrMapOvr>
+    <a:masterClrMapping/>
+  </p:clrMapOvr>
+</p:sld>
+</file>
+
+<file path=ppt/slides/slide3.xml><?xml version="1.0" encoding="utf-8"?>
+<p:sld xmlns:a="http://schemas.openxmlformats.org/drawingml/2006/main" xmlns:r="http://schemas.openxmlformats.org/officeDocument/2006/relationships" xmlns:p="http://schemas.openxmlformats.org/presentationml/2006/main">
+  <p:cSld>
+    <p:spTree>
+      <p:nvGrpSpPr>
+        <p:cNvPr id="1" name=""/>
+        <p:cNvGrpSpPr/>
+        <p:nvPr/>
+      </p:nvGrpSpPr>
+      <p:grpSpPr>
+        <a:xfrm>
+          <a:off x="0" y="0"/>
+          <a:ext cx="0" cy="0"/>
+          <a:chOff x="0" y="0"/>
+          <a:chExt cx="0" cy="0"/>
+        </a:xfrm>
+      </p:grpSpPr>
+      <p:pic>
+        <p:nvPicPr>
+          <p:cNvPr id="15" name="Graphic 14" descr="Smart Phone">
+            <a:extLst>
+              <a:ext uri="{FF2B5EF4-FFF2-40B4-BE49-F238E27FC236}">
+                <a16:creationId xmlns:a16="http://schemas.microsoft.com/office/drawing/2014/main" id="{B26F2D9A-0389-4F5E-9CE3-76AE6DBD72D8}"/>
+              </a:ext>
+            </a:extLst>
+          </p:cNvPr>
+          <p:cNvPicPr>
+            <a:picLocks noChangeAspect="1"/>
+          </p:cNvPicPr>
+          <p:nvPr/>
+        </p:nvPicPr>
+        <p:blipFill>
+          <a:blip r:embed="rId2">
+            <a:extLst>
+              <a:ext uri="{28A0092B-C50C-407E-A947-70E740481C1C}">
+                <a14:useLocalDpi xmlns:a14="http://schemas.microsoft.com/office/drawing/2010/main" val="0"/>
+              </a:ext>
+              <a:ext uri="{96DAC541-7B7A-43D3-8B79-37D633B846F1}">
+                <asvg:svgBlip xmlns:asvg="http://schemas.microsoft.com/office/drawing/2016/SVG/main" r:embed="rId3"/>
+              </a:ext>
+            </a:extLst>
+          </a:blip>
+          <a:stretch>
+            <a:fillRect/>
+          </a:stretch>
+        </p:blipFill>
+        <p:spPr>
+          <a:xfrm>
+            <a:off x="651819" y="2811608"/>
+            <a:ext cx="457200" cy="457200"/>
+          </a:xfrm>
+          <a:prstGeom prst="rect">
+            <a:avLst/>
+          </a:prstGeom>
+        </p:spPr>
+      </p:pic>
+      <p:pic>
+        <p:nvPicPr>
+          <p:cNvPr id="18" name="Graphic 17" descr="Smart Phone">
+            <a:extLst>
+              <a:ext uri="{FF2B5EF4-FFF2-40B4-BE49-F238E27FC236}">
+                <a16:creationId xmlns:a16="http://schemas.microsoft.com/office/drawing/2014/main" id="{A68D5361-5BF4-4832-A4CD-48D24331CBA2}"/>
+              </a:ext>
+            </a:extLst>
+          </p:cNvPr>
+          <p:cNvPicPr>
+            <a:picLocks noChangeAspect="1"/>
+          </p:cNvPicPr>
+          <p:nvPr/>
+        </p:nvPicPr>
+        <p:blipFill>
+          <a:blip r:embed="rId2">
+            <a:extLst>
+              <a:ext uri="{28A0092B-C50C-407E-A947-70E740481C1C}">
+                <a14:useLocalDpi xmlns:a14="http://schemas.microsoft.com/office/drawing/2010/main" val="0"/>
+              </a:ext>
+              <a:ext uri="{96DAC541-7B7A-43D3-8B79-37D633B846F1}">
+                <asvg:svgBlip xmlns:asvg="http://schemas.microsoft.com/office/drawing/2016/SVG/main" r:embed="rId3"/>
+              </a:ext>
+            </a:extLst>
+          </a:blip>
+          <a:stretch>
+            <a:fillRect/>
+          </a:stretch>
+        </p:blipFill>
+        <p:spPr>
+          <a:xfrm>
+            <a:off x="1166210" y="2811608"/>
+            <a:ext cx="457200" cy="457200"/>
+          </a:xfrm>
+          <a:prstGeom prst="rect">
+            <a:avLst/>
+          </a:prstGeom>
+        </p:spPr>
+      </p:pic>
+      <p:pic>
+        <p:nvPicPr>
+          <p:cNvPr id="19" name="Graphic 18" descr="Smart Phone">
+            <a:extLst>
+              <a:ext uri="{FF2B5EF4-FFF2-40B4-BE49-F238E27FC236}">
+                <a16:creationId xmlns:a16="http://schemas.microsoft.com/office/drawing/2014/main" id="{A4F2E9AB-1654-42A4-96CE-56E364489C90}"/>
+              </a:ext>
+            </a:extLst>
+          </p:cNvPr>
+          <p:cNvPicPr>
+            <a:picLocks noChangeAspect="1"/>
+          </p:cNvPicPr>
+          <p:nvPr/>
+        </p:nvPicPr>
+        <p:blipFill>
+          <a:blip r:embed="rId2">
+            <a:extLst>
+              <a:ext uri="{28A0092B-C50C-407E-A947-70E740481C1C}">
+                <a14:useLocalDpi xmlns:a14="http://schemas.microsoft.com/office/drawing/2010/main" val="0"/>
+              </a:ext>
+              <a:ext uri="{96DAC541-7B7A-43D3-8B79-37D633B846F1}">
+                <asvg:svgBlip xmlns:asvg="http://schemas.microsoft.com/office/drawing/2016/SVG/main" r:embed="rId3"/>
+              </a:ext>
+            </a:extLst>
+          </a:blip>
+          <a:stretch>
+            <a:fillRect/>
+          </a:stretch>
+        </p:blipFill>
+        <p:spPr>
+          <a:xfrm>
+            <a:off x="1602953" y="2811608"/>
+            <a:ext cx="457200" cy="457200"/>
+          </a:xfrm>
+          <a:prstGeom prst="rect">
+            <a:avLst/>
+          </a:prstGeom>
+        </p:spPr>
+      </p:pic>
+      <p:cxnSp>
+        <p:nvCxnSpPr>
+          <p:cNvPr id="67" name="Connector: Curved 66">
+            <a:extLst>
+              <a:ext uri="{FF2B5EF4-FFF2-40B4-BE49-F238E27FC236}">
+                <a16:creationId xmlns:a16="http://schemas.microsoft.com/office/drawing/2014/main" id="{3CC4C0E7-8A33-456E-AB9A-19F7E746862F}"/>
+              </a:ext>
+            </a:extLst>
+          </p:cNvPr>
+          <p:cNvCxnSpPr>
+            <a:cxnSpLocks/>
+            <a:stCxn id="19" idx="2"/>
+          </p:cNvCxnSpPr>
+          <p:nvPr/>
+        </p:nvCxnSpPr>
+        <p:spPr>
+          <a:xfrm rot="16200000" flipH="1">
+            <a:off x="1891668" y="3208692"/>
+            <a:ext cx="844910" cy="965141"/>
+          </a:xfrm>
+          <a:prstGeom prst="curvedConnector2">
+            <a:avLst/>
+          </a:prstGeom>
+          <a:ln>
+            <a:headEnd type="triangle"/>
+            <a:tailEnd type="triangle"/>
+          </a:ln>
+        </p:spPr>
+        <p:style>
+          <a:lnRef idx="1">
+            <a:schemeClr val="accent1"/>
+          </a:lnRef>
+          <a:fillRef idx="0">
+            <a:schemeClr val="accent1"/>
+          </a:fillRef>
+          <a:effectRef idx="0">
+            <a:schemeClr val="accent1"/>
+          </a:effectRef>
+          <a:fontRef idx="minor">
+            <a:schemeClr val="tx1"/>
+          </a:fontRef>
+        </p:style>
+      </p:cxnSp>
+      <p:cxnSp>
+        <p:nvCxnSpPr>
+          <p:cNvPr id="69" name="Connector: Curved 68">
+            <a:extLst>
+              <a:ext uri="{FF2B5EF4-FFF2-40B4-BE49-F238E27FC236}">
+                <a16:creationId xmlns:a16="http://schemas.microsoft.com/office/drawing/2014/main" id="{B868B35F-7240-464D-8632-09E3BE0AA964}"/>
+              </a:ext>
+            </a:extLst>
+          </p:cNvPr>
+          <p:cNvCxnSpPr>
+            <a:cxnSpLocks/>
+            <a:stCxn id="18" idx="2"/>
+          </p:cNvCxnSpPr>
+          <p:nvPr/>
+        </p:nvCxnSpPr>
+        <p:spPr>
+          <a:xfrm rot="16200000" flipH="1">
+            <a:off x="1673297" y="2990321"/>
+            <a:ext cx="844910" cy="1401884"/>
+          </a:xfrm>
+          <a:prstGeom prst="curvedConnector2">
+            <a:avLst/>
+          </a:prstGeom>
+          <a:ln>
+            <a:headEnd type="triangle"/>
+            <a:tailEnd type="triangle"/>
+          </a:ln>
+        </p:spPr>
+        <p:style>
+          <a:lnRef idx="1">
+            <a:schemeClr val="accent1"/>
+          </a:lnRef>
+          <a:fillRef idx="0">
+            <a:schemeClr val="accent1"/>
+          </a:fillRef>
+          <a:effectRef idx="0">
+            <a:schemeClr val="accent1"/>
+          </a:effectRef>
+          <a:fontRef idx="minor">
+            <a:schemeClr val="tx1"/>
+          </a:fontRef>
+        </p:style>
+      </p:cxnSp>
+      <p:cxnSp>
+        <p:nvCxnSpPr>
+          <p:cNvPr id="71" name="Connector: Curved 70">
+            <a:extLst>
+              <a:ext uri="{FF2B5EF4-FFF2-40B4-BE49-F238E27FC236}">
+                <a16:creationId xmlns:a16="http://schemas.microsoft.com/office/drawing/2014/main" id="{F4029B8D-7D2F-4A22-8BE2-A243426A9C77}"/>
+              </a:ext>
+            </a:extLst>
+          </p:cNvPr>
+          <p:cNvCxnSpPr>
+            <a:cxnSpLocks/>
+            <a:stCxn id="15" idx="2"/>
+          </p:cNvCxnSpPr>
+          <p:nvPr/>
+        </p:nvCxnSpPr>
+        <p:spPr>
+          <a:xfrm rot="16200000" flipH="1">
+            <a:off x="1416101" y="2733125"/>
+            <a:ext cx="844910" cy="1916275"/>
+          </a:xfrm>
+          <a:prstGeom prst="curvedConnector2">
+            <a:avLst/>
+          </a:prstGeom>
+          <a:ln>
+            <a:headEnd type="triangle"/>
+            <a:tailEnd type="triangle"/>
+          </a:ln>
+        </p:spPr>
+        <p:style>
+          <a:lnRef idx="1">
+            <a:schemeClr val="accent1"/>
+          </a:lnRef>
+          <a:fillRef idx="0">
+            <a:schemeClr val="accent1"/>
+          </a:fillRef>
+          <a:effectRef idx="0">
+            <a:schemeClr val="accent1"/>
+          </a:effectRef>
+          <a:fontRef idx="minor">
+            <a:schemeClr val="tx1"/>
+          </a:fontRef>
+        </p:style>
+      </p:cxnSp>
+      <p:cxnSp>
+        <p:nvCxnSpPr>
+          <p:cNvPr id="121" name="Connector: Curved 120">
+            <a:extLst>
+              <a:ext uri="{FF2B5EF4-FFF2-40B4-BE49-F238E27FC236}">
+                <a16:creationId xmlns:a16="http://schemas.microsoft.com/office/drawing/2014/main" id="{7F9B236A-46B9-4CAA-9E1E-846355322AEF}"/>
+              </a:ext>
+            </a:extLst>
+          </p:cNvPr>
+          <p:cNvCxnSpPr>
+            <a:cxnSpLocks/>
+          </p:cNvCxnSpPr>
+          <p:nvPr/>
+        </p:nvCxnSpPr>
+        <p:spPr>
+          <a:xfrm rot="16200000" flipV="1">
+            <a:off x="1576356" y="2403359"/>
+            <a:ext cx="1909906" cy="716073"/>
+          </a:xfrm>
+          <a:prstGeom prst="curvedConnector3">
+            <a:avLst>
+              <a:gd name="adj1" fmla="val 68518"/>
+            </a:avLst>
+          </a:prstGeom>
+          <a:ln>
+            <a:tailEnd type="triangle"/>
+          </a:ln>
+        </p:spPr>
+        <p:style>
+          <a:lnRef idx="1">
+            <a:schemeClr val="accent1"/>
+          </a:lnRef>
+          <a:fillRef idx="0">
+            <a:schemeClr val="accent1"/>
+          </a:fillRef>
+          <a:effectRef idx="0">
+            <a:schemeClr val="accent1"/>
+          </a:effectRef>
+          <a:fontRef idx="minor">
+            <a:schemeClr val="tx1"/>
+          </a:fontRef>
+        </p:style>
+      </p:cxnSp>
+      <p:cxnSp>
+        <p:nvCxnSpPr>
+          <p:cNvPr id="124" name="Connector: Curved 123">
+            <a:extLst>
+              <a:ext uri="{FF2B5EF4-FFF2-40B4-BE49-F238E27FC236}">
+                <a16:creationId xmlns:a16="http://schemas.microsoft.com/office/drawing/2014/main" id="{53FE312B-72AD-4E57-A253-2FFF7B5C59D1}"/>
+              </a:ext>
+            </a:extLst>
+          </p:cNvPr>
+          <p:cNvCxnSpPr>
+            <a:cxnSpLocks/>
+          </p:cNvCxnSpPr>
+          <p:nvPr/>
+        </p:nvCxnSpPr>
+        <p:spPr>
+          <a:xfrm rot="16200000" flipV="1">
+            <a:off x="987418" y="1844098"/>
+            <a:ext cx="1950673" cy="1875367"/>
+          </a:xfrm>
+          <a:prstGeom prst="curvedConnector3">
+            <a:avLst>
+              <a:gd name="adj1" fmla="val 61940"/>
+            </a:avLst>
+          </a:prstGeom>
+          <a:ln>
+            <a:tailEnd type="triangle"/>
+          </a:ln>
+        </p:spPr>
+        <p:style>
+          <a:lnRef idx="1">
+            <a:schemeClr val="accent1"/>
+          </a:lnRef>
+          <a:fillRef idx="0">
+            <a:schemeClr val="accent1"/>
+          </a:fillRef>
+          <a:effectRef idx="0">
+            <a:schemeClr val="accent1"/>
+          </a:effectRef>
+          <a:fontRef idx="minor">
+            <a:schemeClr val="tx1"/>
+          </a:fontRef>
+        </p:style>
+      </p:cxnSp>
+      <p:cxnSp>
+        <p:nvCxnSpPr>
+          <p:cNvPr id="135" name="Straight Arrow Connector 134">
+            <a:extLst>
+              <a:ext uri="{FF2B5EF4-FFF2-40B4-BE49-F238E27FC236}">
+                <a16:creationId xmlns:a16="http://schemas.microsoft.com/office/drawing/2014/main" id="{E3D4809F-46F2-45AB-9212-B21139D1E38C}"/>
+              </a:ext>
+            </a:extLst>
+          </p:cNvPr>
+          <p:cNvCxnSpPr>
+            <a:cxnSpLocks/>
+          </p:cNvCxnSpPr>
+          <p:nvPr/>
+        </p:nvCxnSpPr>
+        <p:spPr>
+          <a:xfrm>
+            <a:off x="3699330" y="4113718"/>
+            <a:ext cx="945839" cy="0"/>
+          </a:xfrm>
+          <a:prstGeom prst="straightConnector1">
+            <a:avLst/>
+          </a:prstGeom>
+          <a:ln w="53975">
+            <a:tailEnd type="triangle"/>
+          </a:ln>
+        </p:spPr>
+        <p:style>
+          <a:lnRef idx="1">
+            <a:schemeClr val="accent1"/>
+          </a:lnRef>
+          <a:fillRef idx="0">
+            <a:schemeClr val="accent1"/>
+          </a:fillRef>
+          <a:effectRef idx="0">
+            <a:schemeClr val="accent1"/>
+          </a:effectRef>
+          <a:fontRef idx="minor">
+            <a:schemeClr val="tx1"/>
+          </a:fontRef>
+        </p:style>
+      </p:cxnSp>
+      <p:sp>
+        <p:nvSpPr>
+          <p:cNvPr id="141" name="TextBox 140">
+            <a:extLst>
+              <a:ext uri="{FF2B5EF4-FFF2-40B4-BE49-F238E27FC236}">
+                <a16:creationId xmlns:a16="http://schemas.microsoft.com/office/drawing/2014/main" id="{FDFA73C4-2863-4475-A7A2-353585C96372}"/>
+              </a:ext>
+            </a:extLst>
+          </p:cNvPr>
+          <p:cNvSpPr txBox="1"/>
+          <p:nvPr/>
+        </p:nvSpPr>
+        <p:spPr>
+          <a:xfrm>
+            <a:off x="4335825" y="4433612"/>
+            <a:ext cx="1377493" cy="369332"/>
+          </a:xfrm>
+          <a:prstGeom prst="rect">
+            <a:avLst/>
+          </a:prstGeom>
+          <a:noFill/>
+        </p:spPr>
+        <p:txBody>
+          <a:bodyPr wrap="square" rtlCol="0">
+            <a:spAutoFit/>
+          </a:bodyPr>
+          <a:lstStyle/>
+          <a:p>
+            <a:r>
+              <a:rPr lang="en-US" dirty="0"/>
+              <a:t>publicresults</a:t>
+            </a:r>
+          </a:p>
+        </p:txBody>
+      </p:sp>
+      <p:cxnSp>
+        <p:nvCxnSpPr>
+          <p:cNvPr id="143" name="Connector: Curved 142">
+            <a:extLst>
+              <a:ext uri="{FF2B5EF4-FFF2-40B4-BE49-F238E27FC236}">
+                <a16:creationId xmlns:a16="http://schemas.microsoft.com/office/drawing/2014/main" id="{EA06EC34-A278-408E-A58E-B30BBF510876}"/>
+              </a:ext>
+            </a:extLst>
+          </p:cNvPr>
+          <p:cNvCxnSpPr>
+            <a:cxnSpLocks/>
+            <a:endCxn id="45" idx="2"/>
+          </p:cNvCxnSpPr>
+          <p:nvPr/>
+        </p:nvCxnSpPr>
+        <p:spPr>
+          <a:xfrm rot="5400000" flipH="1" flipV="1">
+            <a:off x="4365388" y="3013064"/>
+            <a:ext cx="1337383" cy="19018"/>
+          </a:xfrm>
+          <a:prstGeom prst="curvedConnector3">
+            <a:avLst>
+              <a:gd name="adj1" fmla="val 50000"/>
+            </a:avLst>
+          </a:prstGeom>
+          <a:ln>
+            <a:tailEnd type="triangle"/>
+          </a:ln>
+        </p:spPr>
+        <p:style>
+          <a:lnRef idx="1">
+            <a:schemeClr val="accent1"/>
+          </a:lnRef>
+          <a:fillRef idx="0">
+            <a:schemeClr val="accent1"/>
+          </a:fillRef>
+          <a:effectRef idx="0">
+            <a:schemeClr val="accent1"/>
+          </a:effectRef>
+          <a:fontRef idx="minor">
+            <a:schemeClr val="tx1"/>
+          </a:fontRef>
+        </p:style>
+      </p:cxnSp>
+      <p:pic>
+        <p:nvPicPr>
+          <p:cNvPr id="6" name="Graphic 5" descr="Smart Phone">
+            <a:extLst>
+              <a:ext uri="{FF2B5EF4-FFF2-40B4-BE49-F238E27FC236}">
+                <a16:creationId xmlns:a16="http://schemas.microsoft.com/office/drawing/2014/main" id="{BED10CFA-E443-9C81-0F68-A9E8C92D5B0A}"/>
+              </a:ext>
+            </a:extLst>
+          </p:cNvPr>
+          <p:cNvPicPr>
+            <a:picLocks noChangeAspect="1"/>
+          </p:cNvPicPr>
+          <p:nvPr/>
+        </p:nvPicPr>
+        <p:blipFill>
+          <a:blip r:embed="rId2">
+            <a:extLst>
+              <a:ext uri="{28A0092B-C50C-407E-A947-70E740481C1C}">
+                <a14:useLocalDpi xmlns:a14="http://schemas.microsoft.com/office/drawing/2010/main" val="0"/>
+              </a:ext>
+              <a:ext uri="{96DAC541-7B7A-43D3-8B79-37D633B846F1}">
+                <asvg:svgBlip xmlns:asvg="http://schemas.microsoft.com/office/drawing/2016/SVG/main" r:embed="rId3"/>
+              </a:ext>
+            </a:extLst>
+          </a:blip>
+          <a:stretch>
+            <a:fillRect/>
+          </a:stretch>
+        </p:blipFill>
+        <p:spPr>
+          <a:xfrm>
+            <a:off x="4795971" y="1316174"/>
+            <a:ext cx="457200" cy="457200"/>
+          </a:xfrm>
+          <a:prstGeom prst="rect">
+            <a:avLst/>
+          </a:prstGeom>
+        </p:spPr>
+      </p:pic>
+      <p:sp>
+        <p:nvSpPr>
+          <p:cNvPr id="45" name="TextBox 44">
+            <a:extLst>
+              <a:ext uri="{FF2B5EF4-FFF2-40B4-BE49-F238E27FC236}">
+                <a16:creationId xmlns:a16="http://schemas.microsoft.com/office/drawing/2014/main" id="{F4AB2A22-B940-7C0F-21F5-630FF00120BD}"/>
+              </a:ext>
+            </a:extLst>
+          </p:cNvPr>
+          <p:cNvSpPr txBox="1"/>
+          <p:nvPr/>
+        </p:nvSpPr>
+        <p:spPr>
+          <a:xfrm>
+            <a:off x="4623440" y="1776800"/>
+            <a:ext cx="840295" cy="577081"/>
+          </a:xfrm>
+          <a:prstGeom prst="rect">
+            <a:avLst/>
+          </a:prstGeom>
+          <a:noFill/>
+        </p:spPr>
+        <p:txBody>
+          <a:bodyPr wrap="square" rtlCol="0">
+            <a:spAutoFit/>
+          </a:bodyPr>
+          <a:lstStyle/>
+          <a:p>
+            <a:pPr algn="ctr"/>
+            <a:r>
+              <a:rPr lang="en-US" sz="1050" dirty="0"/>
+              <a:t>Internet-accessed</a:t>
+            </a:r>
+            <a:br>
+              <a:rPr lang="en-US" sz="1050" dirty="0"/>
+            </a:br>
+            <a:r>
+              <a:rPr lang="en-US" sz="1050" dirty="0"/>
+              <a:t>Scoreboard</a:t>
+            </a:r>
+          </a:p>
+        </p:txBody>
+      </p:sp>
+      <p:pic>
+        <p:nvPicPr>
+          <p:cNvPr id="50" name="Graphic 49" descr="Server">
+            <a:extLst>
+              <a:ext uri="{FF2B5EF4-FFF2-40B4-BE49-F238E27FC236}">
+                <a16:creationId xmlns:a16="http://schemas.microsoft.com/office/drawing/2014/main" id="{B8C8395B-044C-245A-B324-865A6E687529}"/>
+              </a:ext>
+            </a:extLst>
+          </p:cNvPr>
+          <p:cNvPicPr>
+            <a:picLocks noChangeAspect="1"/>
+          </p:cNvPicPr>
+          <p:nvPr/>
+        </p:nvPicPr>
+        <p:blipFill>
+          <a:blip r:embed="rId4">
+            <a:extLst>
+              <a:ext uri="{28A0092B-C50C-407E-A947-70E740481C1C}">
+                <a14:useLocalDpi xmlns:a14="http://schemas.microsoft.com/office/drawing/2010/main" val="0"/>
+              </a:ext>
+              <a:ext uri="{96DAC541-7B7A-43D3-8B79-37D633B846F1}">
+                <asvg:svgBlip xmlns:asvg="http://schemas.microsoft.com/office/drawing/2016/SVG/main" r:embed="rId5"/>
+              </a:ext>
+            </a:extLst>
+          </a:blip>
+          <a:stretch>
+            <a:fillRect/>
+          </a:stretch>
+        </p:blipFill>
+        <p:spPr>
+          <a:xfrm>
+            <a:off x="4589183" y="3656518"/>
+            <a:ext cx="914400" cy="914400"/>
+          </a:xfrm>
+          <a:prstGeom prst="rect">
+            <a:avLst/>
+          </a:prstGeom>
+        </p:spPr>
+      </p:pic>
+      <p:sp>
+        <p:nvSpPr>
+          <p:cNvPr id="2" name="Rectangle 1">
+            <a:extLst>
+              <a:ext uri="{FF2B5EF4-FFF2-40B4-BE49-F238E27FC236}">
+                <a16:creationId xmlns:a16="http://schemas.microsoft.com/office/drawing/2014/main" id="{F5100FEA-6C24-1222-FB4A-4EF6532145B6}"/>
+              </a:ext>
+            </a:extLst>
+          </p:cNvPr>
+          <p:cNvSpPr/>
+          <p:nvPr/>
+        </p:nvSpPr>
+        <p:spPr>
+          <a:xfrm>
+            <a:off x="298581" y="501110"/>
+            <a:ext cx="3516861" cy="5492108"/>
+          </a:xfrm>
+          <a:prstGeom prst="rect">
+            <a:avLst/>
+          </a:prstGeom>
+          <a:noFill/>
+        </p:spPr>
+        <p:style>
+          <a:lnRef idx="2">
+            <a:schemeClr val="accent1">
+              <a:shade val="50000"/>
+            </a:schemeClr>
+          </a:lnRef>
+          <a:fillRef idx="1">
+            <a:schemeClr val="accent1"/>
+          </a:fillRef>
+          <a:effectRef idx="0">
+            <a:schemeClr val="accent1"/>
+          </a:effectRef>
+          <a:fontRef idx="minor">
+            <a:schemeClr val="lt1"/>
+          </a:fontRef>
+        </p:style>
+        <p:txBody>
+          <a:bodyPr rtlCol="0" anchor="ctr"/>
+          <a:lstStyle/>
+          <a:p>
+            <a:pPr algn="ctr"/>
+            <a:endParaRPr lang="en-US" dirty="0"/>
+          </a:p>
+        </p:txBody>
+      </p:sp>
+      <p:sp>
+        <p:nvSpPr>
+          <p:cNvPr id="3" name="TextBox 2">
+            <a:extLst>
+              <a:ext uri="{FF2B5EF4-FFF2-40B4-BE49-F238E27FC236}">
+                <a16:creationId xmlns:a16="http://schemas.microsoft.com/office/drawing/2014/main" id="{970D06AB-77A6-827C-D053-6136DCDB3474}"/>
+              </a:ext>
+            </a:extLst>
+          </p:cNvPr>
+          <p:cNvSpPr txBox="1"/>
+          <p:nvPr/>
+        </p:nvSpPr>
+        <p:spPr>
+          <a:xfrm>
+            <a:off x="285498" y="5617520"/>
+            <a:ext cx="2484016" cy="369332"/>
+          </a:xfrm>
+          <a:prstGeom prst="rect">
+            <a:avLst/>
+          </a:prstGeom>
+          <a:noFill/>
+        </p:spPr>
+        <p:txBody>
+          <a:bodyPr wrap="square" rtlCol="0">
+            <a:spAutoFit/>
+          </a:bodyPr>
+          <a:lstStyle/>
+          <a:p>
+            <a:r>
+              <a:rPr lang="en-US" i="1" dirty="0"/>
+              <a:t>Competition Site</a:t>
+            </a:r>
+          </a:p>
+        </p:txBody>
+      </p:sp>
+      <p:sp>
+        <p:nvSpPr>
+          <p:cNvPr id="5" name="TextBox 4">
+            <a:extLst>
+              <a:ext uri="{FF2B5EF4-FFF2-40B4-BE49-F238E27FC236}">
+                <a16:creationId xmlns:a16="http://schemas.microsoft.com/office/drawing/2014/main" id="{E88597B3-9330-A16B-795F-4C465CAEF8C9}"/>
+              </a:ext>
+            </a:extLst>
+          </p:cNvPr>
+          <p:cNvSpPr txBox="1"/>
+          <p:nvPr/>
+        </p:nvSpPr>
+        <p:spPr>
+          <a:xfrm>
+            <a:off x="809016" y="2460195"/>
+            <a:ext cx="1110898" cy="369332"/>
+          </a:xfrm>
+          <a:prstGeom prst="rect">
+            <a:avLst/>
+          </a:prstGeom>
+          <a:noFill/>
+        </p:spPr>
+        <p:txBody>
+          <a:bodyPr wrap="square">
+            <a:spAutoFit/>
+          </a:bodyPr>
+          <a:lstStyle/>
+          <a:p>
+            <a:r>
+              <a:rPr lang="en-US" dirty="0"/>
+              <a:t>Referees</a:t>
+            </a:r>
+            <a:endParaRPr lang="en-CA" dirty="0"/>
+          </a:p>
+        </p:txBody>
+      </p:sp>
+      <p:sp>
+        <p:nvSpPr>
+          <p:cNvPr id="8" name="TextBox 7">
+            <a:extLst>
+              <a:ext uri="{FF2B5EF4-FFF2-40B4-BE49-F238E27FC236}">
+                <a16:creationId xmlns:a16="http://schemas.microsoft.com/office/drawing/2014/main" id="{3804DF01-C511-ED65-9989-F44F7AB2163E}"/>
+              </a:ext>
+            </a:extLst>
+          </p:cNvPr>
+          <p:cNvSpPr txBox="1"/>
+          <p:nvPr/>
+        </p:nvSpPr>
+        <p:spPr>
+          <a:xfrm>
+            <a:off x="2798349" y="4375468"/>
+            <a:ext cx="895502" cy="369332"/>
+          </a:xfrm>
+          <a:prstGeom prst="rect">
+            <a:avLst/>
+          </a:prstGeom>
+          <a:noFill/>
+        </p:spPr>
+        <p:txBody>
+          <a:bodyPr wrap="none" rtlCol="0">
+            <a:spAutoFit/>
+          </a:bodyPr>
+          <a:lstStyle/>
+          <a:p>
+            <a:r>
+              <a:rPr lang="en-US" dirty="0"/>
+              <a:t>owlcms</a:t>
+            </a:r>
+          </a:p>
+        </p:txBody>
+      </p:sp>
+      <p:sp>
+        <p:nvSpPr>
+          <p:cNvPr id="10" name="TextBox 9">
+            <a:extLst>
+              <a:ext uri="{FF2B5EF4-FFF2-40B4-BE49-F238E27FC236}">
+                <a16:creationId xmlns:a16="http://schemas.microsoft.com/office/drawing/2014/main" id="{EF31240E-65D8-199E-85D1-677B4950C62B}"/>
+              </a:ext>
+            </a:extLst>
+          </p:cNvPr>
+          <p:cNvSpPr txBox="1"/>
+          <p:nvPr/>
+        </p:nvSpPr>
+        <p:spPr>
+          <a:xfrm>
+            <a:off x="2642248" y="4665350"/>
+            <a:ext cx="1220206" cy="369332"/>
+          </a:xfrm>
+          <a:prstGeom prst="rect">
+            <a:avLst/>
+          </a:prstGeom>
+          <a:noFill/>
+        </p:spPr>
+        <p:txBody>
+          <a:bodyPr wrap="none" rtlCol="0">
+            <a:spAutoFit/>
+          </a:bodyPr>
+          <a:lstStyle/>
+          <a:p>
+            <a:r>
+              <a:rPr lang="en-US" dirty="0"/>
+              <a:t>Announcer</a:t>
+            </a:r>
+          </a:p>
+        </p:txBody>
+      </p:sp>
+      <p:pic>
+        <p:nvPicPr>
+          <p:cNvPr id="11" name="Graphic 10" descr="Laptop">
+            <a:extLst>
+              <a:ext uri="{FF2B5EF4-FFF2-40B4-BE49-F238E27FC236}">
+                <a16:creationId xmlns:a16="http://schemas.microsoft.com/office/drawing/2014/main" id="{032C1AB0-6E58-5751-7C29-79736D414132}"/>
+              </a:ext>
+            </a:extLst>
+          </p:cNvPr>
+          <p:cNvPicPr>
+            <a:picLocks noChangeAspect="1"/>
+          </p:cNvPicPr>
+          <p:nvPr/>
+        </p:nvPicPr>
+        <p:blipFill>
+          <a:blip r:embed="rId6">
+            <a:extLst>
+              <a:ext uri="{28A0092B-C50C-407E-A947-70E740481C1C}">
+                <a14:useLocalDpi xmlns:a14="http://schemas.microsoft.com/office/drawing/2010/main" val="0"/>
+              </a:ext>
+              <a:ext uri="{96DAC541-7B7A-43D3-8B79-37D633B846F1}">
+                <asvg:svgBlip xmlns:asvg="http://schemas.microsoft.com/office/drawing/2016/SVG/main" r:embed="rId7"/>
+              </a:ext>
+            </a:extLst>
+          </a:blip>
+          <a:stretch>
+            <a:fillRect/>
+          </a:stretch>
+        </p:blipFill>
+        <p:spPr>
+          <a:xfrm>
+            <a:off x="2788900" y="3620508"/>
+            <a:ext cx="914400" cy="914400"/>
+          </a:xfrm>
+          <a:prstGeom prst="rect">
+            <a:avLst/>
+          </a:prstGeom>
+        </p:spPr>
+      </p:pic>
+      <p:sp>
+        <p:nvSpPr>
+          <p:cNvPr id="13" name="Graphic 45" descr="Cloud">
+            <a:extLst>
+              <a:ext uri="{FF2B5EF4-FFF2-40B4-BE49-F238E27FC236}">
+                <a16:creationId xmlns:a16="http://schemas.microsoft.com/office/drawing/2014/main" id="{EBFCEE4E-E549-41A8-11F9-8FE6FCA09358}"/>
+              </a:ext>
+            </a:extLst>
+          </p:cNvPr>
+          <p:cNvSpPr/>
+          <p:nvPr/>
+        </p:nvSpPr>
+        <p:spPr>
+          <a:xfrm>
+            <a:off x="3938911" y="3317027"/>
+            <a:ext cx="2157090" cy="1516225"/>
           </a:xfrm>
           <a:custGeom>
             <a:avLst/>
@@ -4989,2078 +7016,6 @@
           </a:p>
         </p:txBody>
       </p:sp>
-      <p:cxnSp>
-        <p:nvCxnSpPr>
-          <p:cNvPr id="67" name="Connector: Curved 66">
-            <a:extLst>
-              <a:ext uri="{FF2B5EF4-FFF2-40B4-BE49-F238E27FC236}">
-                <a16:creationId xmlns:a16="http://schemas.microsoft.com/office/drawing/2014/main" id="{3CC4C0E7-8A33-456E-AB9A-19F7E746862F}"/>
-              </a:ext>
-            </a:extLst>
-          </p:cNvPr>
-          <p:cNvCxnSpPr>
-            <a:cxnSpLocks/>
-            <a:stCxn id="19" idx="2"/>
-          </p:cNvCxnSpPr>
-          <p:nvPr/>
-        </p:nvCxnSpPr>
-        <p:spPr>
-          <a:xfrm rot="16200000" flipH="1">
-            <a:off x="1891668" y="3208692"/>
-            <a:ext cx="844910" cy="965141"/>
-          </a:xfrm>
-          <a:prstGeom prst="curvedConnector2">
-            <a:avLst/>
-          </a:prstGeom>
-          <a:ln>
-            <a:headEnd type="triangle"/>
-            <a:tailEnd type="triangle"/>
-          </a:ln>
-        </p:spPr>
-        <p:style>
-          <a:lnRef idx="1">
-            <a:schemeClr val="accent1"/>
-          </a:lnRef>
-          <a:fillRef idx="0">
-            <a:schemeClr val="accent1"/>
-          </a:fillRef>
-          <a:effectRef idx="0">
-            <a:schemeClr val="accent1"/>
-          </a:effectRef>
-          <a:fontRef idx="minor">
-            <a:schemeClr val="tx1"/>
-          </a:fontRef>
-        </p:style>
-      </p:cxnSp>
-      <p:cxnSp>
-        <p:nvCxnSpPr>
-          <p:cNvPr id="69" name="Connector: Curved 68">
-            <a:extLst>
-              <a:ext uri="{FF2B5EF4-FFF2-40B4-BE49-F238E27FC236}">
-                <a16:creationId xmlns:a16="http://schemas.microsoft.com/office/drawing/2014/main" id="{B868B35F-7240-464D-8632-09E3BE0AA964}"/>
-              </a:ext>
-            </a:extLst>
-          </p:cNvPr>
-          <p:cNvCxnSpPr>
-            <a:cxnSpLocks/>
-            <a:stCxn id="18" idx="2"/>
-          </p:cNvCxnSpPr>
-          <p:nvPr/>
-        </p:nvCxnSpPr>
-        <p:spPr>
-          <a:xfrm rot="16200000" flipH="1">
-            <a:off x="1673297" y="2990321"/>
-            <a:ext cx="844910" cy="1401884"/>
-          </a:xfrm>
-          <a:prstGeom prst="curvedConnector2">
-            <a:avLst/>
-          </a:prstGeom>
-          <a:ln>
-            <a:headEnd type="triangle"/>
-            <a:tailEnd type="triangle"/>
-          </a:ln>
-        </p:spPr>
-        <p:style>
-          <a:lnRef idx="1">
-            <a:schemeClr val="accent1"/>
-          </a:lnRef>
-          <a:fillRef idx="0">
-            <a:schemeClr val="accent1"/>
-          </a:fillRef>
-          <a:effectRef idx="0">
-            <a:schemeClr val="accent1"/>
-          </a:effectRef>
-          <a:fontRef idx="minor">
-            <a:schemeClr val="tx1"/>
-          </a:fontRef>
-        </p:style>
-      </p:cxnSp>
-      <p:cxnSp>
-        <p:nvCxnSpPr>
-          <p:cNvPr id="71" name="Connector: Curved 70">
-            <a:extLst>
-              <a:ext uri="{FF2B5EF4-FFF2-40B4-BE49-F238E27FC236}">
-                <a16:creationId xmlns:a16="http://schemas.microsoft.com/office/drawing/2014/main" id="{F4029B8D-7D2F-4A22-8BE2-A243426A9C77}"/>
-              </a:ext>
-            </a:extLst>
-          </p:cNvPr>
-          <p:cNvCxnSpPr>
-            <a:cxnSpLocks/>
-            <a:stCxn id="15" idx="2"/>
-          </p:cNvCxnSpPr>
-          <p:nvPr/>
-        </p:nvCxnSpPr>
-        <p:spPr>
-          <a:xfrm rot="16200000" flipH="1">
-            <a:off x="1416101" y="2733125"/>
-            <a:ext cx="844910" cy="1916275"/>
-          </a:xfrm>
-          <a:prstGeom prst="curvedConnector2">
-            <a:avLst/>
-          </a:prstGeom>
-          <a:ln>
-            <a:headEnd type="triangle"/>
-            <a:tailEnd type="triangle"/>
-          </a:ln>
-        </p:spPr>
-        <p:style>
-          <a:lnRef idx="1">
-            <a:schemeClr val="accent1"/>
-          </a:lnRef>
-          <a:fillRef idx="0">
-            <a:schemeClr val="accent1"/>
-          </a:fillRef>
-          <a:effectRef idx="0">
-            <a:schemeClr val="accent1"/>
-          </a:effectRef>
-          <a:fontRef idx="minor">
-            <a:schemeClr val="tx1"/>
-          </a:fontRef>
-        </p:style>
-      </p:cxnSp>
-      <p:cxnSp>
-        <p:nvCxnSpPr>
-          <p:cNvPr id="76" name="Connector: Curved 75">
-            <a:extLst>
-              <a:ext uri="{FF2B5EF4-FFF2-40B4-BE49-F238E27FC236}">
-                <a16:creationId xmlns:a16="http://schemas.microsoft.com/office/drawing/2014/main" id="{B0E96370-52C4-45E3-ABB7-F38BD45E9E71}"/>
-              </a:ext>
-            </a:extLst>
-          </p:cNvPr>
-          <p:cNvCxnSpPr>
-            <a:cxnSpLocks/>
-          </p:cNvCxnSpPr>
-          <p:nvPr/>
-        </p:nvCxnSpPr>
-        <p:spPr>
-          <a:xfrm flipV="1">
-            <a:off x="1784372" y="4113718"/>
-            <a:ext cx="1012322" cy="417138"/>
-          </a:xfrm>
-          <a:prstGeom prst="curvedConnector3">
-            <a:avLst>
-              <a:gd name="adj1" fmla="val 50000"/>
-            </a:avLst>
-          </a:prstGeom>
-          <a:ln>
-            <a:headEnd type="triangle"/>
-            <a:tailEnd type="triangle"/>
-          </a:ln>
-        </p:spPr>
-        <p:style>
-          <a:lnRef idx="1">
-            <a:schemeClr val="accent1"/>
-          </a:lnRef>
-          <a:fillRef idx="0">
-            <a:schemeClr val="accent1"/>
-          </a:fillRef>
-          <a:effectRef idx="0">
-            <a:schemeClr val="accent1"/>
-          </a:effectRef>
-          <a:fontRef idx="minor">
-            <a:schemeClr val="tx1"/>
-          </a:fontRef>
-        </p:style>
-      </p:cxnSp>
-      <p:cxnSp>
-        <p:nvCxnSpPr>
-          <p:cNvPr id="121" name="Connector: Curved 120">
-            <a:extLst>
-              <a:ext uri="{FF2B5EF4-FFF2-40B4-BE49-F238E27FC236}">
-                <a16:creationId xmlns:a16="http://schemas.microsoft.com/office/drawing/2014/main" id="{7F9B236A-46B9-4CAA-9E1E-846355322AEF}"/>
-              </a:ext>
-            </a:extLst>
-          </p:cNvPr>
-          <p:cNvCxnSpPr>
-            <a:cxnSpLocks/>
-          </p:cNvCxnSpPr>
-          <p:nvPr/>
-        </p:nvCxnSpPr>
-        <p:spPr>
-          <a:xfrm rot="16200000" flipV="1">
-            <a:off x="1576356" y="2403359"/>
-            <a:ext cx="1909906" cy="716073"/>
-          </a:xfrm>
-          <a:prstGeom prst="curvedConnector3">
-            <a:avLst>
-              <a:gd name="adj1" fmla="val 68518"/>
-            </a:avLst>
-          </a:prstGeom>
-          <a:ln>
-            <a:tailEnd type="triangle"/>
-          </a:ln>
-        </p:spPr>
-        <p:style>
-          <a:lnRef idx="1">
-            <a:schemeClr val="accent1"/>
-          </a:lnRef>
-          <a:fillRef idx="0">
-            <a:schemeClr val="accent1"/>
-          </a:fillRef>
-          <a:effectRef idx="0">
-            <a:schemeClr val="accent1"/>
-          </a:effectRef>
-          <a:fontRef idx="minor">
-            <a:schemeClr val="tx1"/>
-          </a:fontRef>
-        </p:style>
-      </p:cxnSp>
-      <p:cxnSp>
-        <p:nvCxnSpPr>
-          <p:cNvPr id="124" name="Connector: Curved 123">
-            <a:extLst>
-              <a:ext uri="{FF2B5EF4-FFF2-40B4-BE49-F238E27FC236}">
-                <a16:creationId xmlns:a16="http://schemas.microsoft.com/office/drawing/2014/main" id="{53FE312B-72AD-4E57-A253-2FFF7B5C59D1}"/>
-              </a:ext>
-            </a:extLst>
-          </p:cNvPr>
-          <p:cNvCxnSpPr>
-            <a:cxnSpLocks/>
-          </p:cNvCxnSpPr>
-          <p:nvPr/>
-        </p:nvCxnSpPr>
-        <p:spPr>
-          <a:xfrm rot="16200000" flipV="1">
-            <a:off x="987418" y="1844098"/>
-            <a:ext cx="1950673" cy="1875367"/>
-          </a:xfrm>
-          <a:prstGeom prst="curvedConnector3">
-            <a:avLst>
-              <a:gd name="adj1" fmla="val 61940"/>
-            </a:avLst>
-          </a:prstGeom>
-          <a:ln>
-            <a:tailEnd type="triangle"/>
-          </a:ln>
-        </p:spPr>
-        <p:style>
-          <a:lnRef idx="1">
-            <a:schemeClr val="accent1"/>
-          </a:lnRef>
-          <a:fillRef idx="0">
-            <a:schemeClr val="accent1"/>
-          </a:fillRef>
-          <a:effectRef idx="0">
-            <a:schemeClr val="accent1"/>
-          </a:effectRef>
-          <a:fontRef idx="minor">
-            <a:schemeClr val="tx1"/>
-          </a:fontRef>
-        </p:style>
-      </p:cxnSp>
-      <p:cxnSp>
-        <p:nvCxnSpPr>
-          <p:cNvPr id="135" name="Straight Arrow Connector 134">
-            <a:extLst>
-              <a:ext uri="{FF2B5EF4-FFF2-40B4-BE49-F238E27FC236}">
-                <a16:creationId xmlns:a16="http://schemas.microsoft.com/office/drawing/2014/main" id="{E3D4809F-46F2-45AB-9212-B21139D1E38C}"/>
-              </a:ext>
-            </a:extLst>
-          </p:cNvPr>
-          <p:cNvCxnSpPr>
-            <a:cxnSpLocks/>
-          </p:cNvCxnSpPr>
-          <p:nvPr/>
-        </p:nvCxnSpPr>
-        <p:spPr>
-          <a:xfrm>
-            <a:off x="3699330" y="4113718"/>
-            <a:ext cx="945839" cy="0"/>
-          </a:xfrm>
-          <a:prstGeom prst="straightConnector1">
-            <a:avLst/>
-          </a:prstGeom>
-          <a:ln w="53975">
-            <a:tailEnd type="triangle"/>
-          </a:ln>
-        </p:spPr>
-        <p:style>
-          <a:lnRef idx="1">
-            <a:schemeClr val="accent1"/>
-          </a:lnRef>
-          <a:fillRef idx="0">
-            <a:schemeClr val="accent1"/>
-          </a:fillRef>
-          <a:effectRef idx="0">
-            <a:schemeClr val="accent1"/>
-          </a:effectRef>
-          <a:fontRef idx="minor">
-            <a:schemeClr val="tx1"/>
-          </a:fontRef>
-        </p:style>
-      </p:cxnSp>
-      <p:sp>
-        <p:nvSpPr>
-          <p:cNvPr id="141" name="TextBox 140">
-            <a:extLst>
-              <a:ext uri="{FF2B5EF4-FFF2-40B4-BE49-F238E27FC236}">
-                <a16:creationId xmlns:a16="http://schemas.microsoft.com/office/drawing/2014/main" id="{FDFA73C4-2863-4475-A7A2-353585C96372}"/>
-              </a:ext>
-            </a:extLst>
-          </p:cNvPr>
-          <p:cNvSpPr txBox="1"/>
-          <p:nvPr/>
-        </p:nvSpPr>
-        <p:spPr>
-          <a:xfrm>
-            <a:off x="4335825" y="4433612"/>
-            <a:ext cx="1377493" cy="369332"/>
-          </a:xfrm>
-          <a:prstGeom prst="rect">
-            <a:avLst/>
-          </a:prstGeom>
-          <a:noFill/>
-        </p:spPr>
-        <p:txBody>
-          <a:bodyPr wrap="square" rtlCol="0">
-            <a:spAutoFit/>
-          </a:bodyPr>
-          <a:lstStyle/>
-          <a:p>
-            <a:r>
-              <a:rPr lang="en-US" dirty="0"/>
-              <a:t>publicresults</a:t>
-            </a:r>
-          </a:p>
-        </p:txBody>
-      </p:sp>
-      <p:cxnSp>
-        <p:nvCxnSpPr>
-          <p:cNvPr id="143" name="Connector: Curved 142">
-            <a:extLst>
-              <a:ext uri="{FF2B5EF4-FFF2-40B4-BE49-F238E27FC236}">
-                <a16:creationId xmlns:a16="http://schemas.microsoft.com/office/drawing/2014/main" id="{EA06EC34-A278-408E-A58E-B30BBF510876}"/>
-              </a:ext>
-            </a:extLst>
-          </p:cNvPr>
-          <p:cNvCxnSpPr>
-            <a:cxnSpLocks/>
-            <a:endCxn id="45" idx="2"/>
-          </p:cNvCxnSpPr>
-          <p:nvPr/>
-        </p:nvCxnSpPr>
-        <p:spPr>
-          <a:xfrm rot="5400000" flipH="1" flipV="1">
-            <a:off x="4365388" y="3013064"/>
-            <a:ext cx="1337383" cy="19018"/>
-          </a:xfrm>
-          <a:prstGeom prst="curvedConnector3">
-            <a:avLst>
-              <a:gd name="adj1" fmla="val 50000"/>
-            </a:avLst>
-          </a:prstGeom>
-          <a:ln>
-            <a:tailEnd type="triangle"/>
-          </a:ln>
-        </p:spPr>
-        <p:style>
-          <a:lnRef idx="1">
-            <a:schemeClr val="accent1"/>
-          </a:lnRef>
-          <a:fillRef idx="0">
-            <a:schemeClr val="accent1"/>
-          </a:fillRef>
-          <a:effectRef idx="0">
-            <a:schemeClr val="accent1"/>
-          </a:effectRef>
-          <a:fontRef idx="minor">
-            <a:schemeClr val="tx1"/>
-          </a:fontRef>
-        </p:style>
-      </p:cxnSp>
-      <p:pic>
-        <p:nvPicPr>
-          <p:cNvPr id="6" name="Graphic 5" descr="Smart Phone">
-            <a:extLst>
-              <a:ext uri="{FF2B5EF4-FFF2-40B4-BE49-F238E27FC236}">
-                <a16:creationId xmlns:a16="http://schemas.microsoft.com/office/drawing/2014/main" id="{BED10CFA-E443-9C81-0F68-A9E8C92D5B0A}"/>
-              </a:ext>
-            </a:extLst>
-          </p:cNvPr>
-          <p:cNvPicPr>
-            <a:picLocks noChangeAspect="1"/>
-          </p:cNvPicPr>
-          <p:nvPr/>
-        </p:nvPicPr>
-        <p:blipFill>
-          <a:blip r:embed="rId2">
-            <a:extLst>
-              <a:ext uri="{28A0092B-C50C-407E-A947-70E740481C1C}">
-                <a14:useLocalDpi xmlns:a14="http://schemas.microsoft.com/office/drawing/2010/main" val="0"/>
-              </a:ext>
-              <a:ext uri="{96DAC541-7B7A-43D3-8B79-37D633B846F1}">
-                <asvg:svgBlip xmlns:asvg="http://schemas.microsoft.com/office/drawing/2016/SVG/main" r:embed="rId3"/>
-              </a:ext>
-            </a:extLst>
-          </a:blip>
-          <a:stretch>
-            <a:fillRect/>
-          </a:stretch>
-        </p:blipFill>
-        <p:spPr>
-          <a:xfrm>
-            <a:off x="4795971" y="1316174"/>
-            <a:ext cx="457200" cy="457200"/>
-          </a:xfrm>
-          <a:prstGeom prst="rect">
-            <a:avLst/>
-          </a:prstGeom>
-        </p:spPr>
-      </p:pic>
-      <p:sp>
-        <p:nvSpPr>
-          <p:cNvPr id="45" name="TextBox 44">
-            <a:extLst>
-              <a:ext uri="{FF2B5EF4-FFF2-40B4-BE49-F238E27FC236}">
-                <a16:creationId xmlns:a16="http://schemas.microsoft.com/office/drawing/2014/main" id="{F4AB2A22-B940-7C0F-21F5-630FF00120BD}"/>
-              </a:ext>
-            </a:extLst>
-          </p:cNvPr>
-          <p:cNvSpPr txBox="1"/>
-          <p:nvPr/>
-        </p:nvSpPr>
-        <p:spPr>
-          <a:xfrm>
-            <a:off x="4623440" y="1776800"/>
-            <a:ext cx="840295" cy="577081"/>
-          </a:xfrm>
-          <a:prstGeom prst="rect">
-            <a:avLst/>
-          </a:prstGeom>
-          <a:noFill/>
-        </p:spPr>
-        <p:txBody>
-          <a:bodyPr wrap="square" rtlCol="0">
-            <a:spAutoFit/>
-          </a:bodyPr>
-          <a:lstStyle/>
-          <a:p>
-            <a:pPr algn="ctr"/>
-            <a:r>
-              <a:rPr lang="en-US" sz="1050" dirty="0"/>
-              <a:t>Internet-accessed</a:t>
-            </a:r>
-            <a:br>
-              <a:rPr lang="en-US" sz="1050" dirty="0"/>
-            </a:br>
-            <a:r>
-              <a:rPr lang="en-US" sz="1050" dirty="0"/>
-              <a:t>Scoreboard</a:t>
-            </a:r>
-          </a:p>
-        </p:txBody>
-      </p:sp>
-      <p:pic>
-        <p:nvPicPr>
-          <p:cNvPr id="50" name="Graphic 49" descr="Server">
-            <a:extLst>
-              <a:ext uri="{FF2B5EF4-FFF2-40B4-BE49-F238E27FC236}">
-                <a16:creationId xmlns:a16="http://schemas.microsoft.com/office/drawing/2014/main" id="{B8C8395B-044C-245A-B324-865A6E687529}"/>
-              </a:ext>
-            </a:extLst>
-          </p:cNvPr>
-          <p:cNvPicPr>
-            <a:picLocks noChangeAspect="1"/>
-          </p:cNvPicPr>
-          <p:nvPr/>
-        </p:nvPicPr>
-        <p:blipFill>
-          <a:blip r:embed="rId4">
-            <a:extLst>
-              <a:ext uri="{28A0092B-C50C-407E-A947-70E740481C1C}">
-                <a14:useLocalDpi xmlns:a14="http://schemas.microsoft.com/office/drawing/2010/main" val="0"/>
-              </a:ext>
-              <a:ext uri="{96DAC541-7B7A-43D3-8B79-37D633B846F1}">
-                <asvg:svgBlip xmlns:asvg="http://schemas.microsoft.com/office/drawing/2016/SVG/main" r:embed="rId5"/>
-              </a:ext>
-            </a:extLst>
-          </a:blip>
-          <a:stretch>
-            <a:fillRect/>
-          </a:stretch>
-        </p:blipFill>
-        <p:spPr>
-          <a:xfrm>
-            <a:off x="4589183" y="3656518"/>
-            <a:ext cx="914400" cy="914400"/>
-          </a:xfrm>
-          <a:prstGeom prst="rect">
-            <a:avLst/>
-          </a:prstGeom>
-        </p:spPr>
-      </p:pic>
-      <p:sp>
-        <p:nvSpPr>
-          <p:cNvPr id="2" name="Rectangle 1">
-            <a:extLst>
-              <a:ext uri="{FF2B5EF4-FFF2-40B4-BE49-F238E27FC236}">
-                <a16:creationId xmlns:a16="http://schemas.microsoft.com/office/drawing/2014/main" id="{F5100FEA-6C24-1222-FB4A-4EF6532145B6}"/>
-              </a:ext>
-            </a:extLst>
-          </p:cNvPr>
-          <p:cNvSpPr/>
-          <p:nvPr/>
-        </p:nvSpPr>
-        <p:spPr>
-          <a:xfrm>
-            <a:off x="298582" y="501110"/>
-            <a:ext cx="2219954" cy="5492108"/>
-          </a:xfrm>
-          <a:prstGeom prst="rect">
-            <a:avLst/>
-          </a:prstGeom>
-          <a:noFill/>
-        </p:spPr>
-        <p:style>
-          <a:lnRef idx="2">
-            <a:schemeClr val="accent1">
-              <a:shade val="50000"/>
-            </a:schemeClr>
-          </a:lnRef>
-          <a:fillRef idx="1">
-            <a:schemeClr val="accent1"/>
-          </a:fillRef>
-          <a:effectRef idx="0">
-            <a:schemeClr val="accent1"/>
-          </a:effectRef>
-          <a:fontRef idx="minor">
-            <a:schemeClr val="lt1"/>
-          </a:fontRef>
-        </p:style>
-        <p:txBody>
-          <a:bodyPr rtlCol="0" anchor="ctr"/>
-          <a:lstStyle/>
-          <a:p>
-            <a:pPr algn="ctr"/>
-            <a:endParaRPr lang="en-US" dirty="0"/>
-          </a:p>
-        </p:txBody>
-      </p:sp>
-      <p:sp>
-        <p:nvSpPr>
-          <p:cNvPr id="5" name="TextBox 4">
-            <a:extLst>
-              <a:ext uri="{FF2B5EF4-FFF2-40B4-BE49-F238E27FC236}">
-                <a16:creationId xmlns:a16="http://schemas.microsoft.com/office/drawing/2014/main" id="{E88597B3-9330-A16B-795F-4C465CAEF8C9}"/>
-              </a:ext>
-            </a:extLst>
-          </p:cNvPr>
-          <p:cNvSpPr txBox="1"/>
-          <p:nvPr/>
-        </p:nvSpPr>
-        <p:spPr>
-          <a:xfrm>
-            <a:off x="809016" y="2460195"/>
-            <a:ext cx="1110898" cy="369332"/>
-          </a:xfrm>
-          <a:prstGeom prst="rect">
-            <a:avLst/>
-          </a:prstGeom>
-          <a:noFill/>
-        </p:spPr>
-        <p:txBody>
-          <a:bodyPr wrap="square">
-            <a:spAutoFit/>
-          </a:bodyPr>
-          <a:lstStyle/>
-          <a:p>
-            <a:r>
-              <a:rPr lang="en-US" dirty="0"/>
-              <a:t>Referees</a:t>
-            </a:r>
-            <a:endParaRPr lang="en-CA" dirty="0"/>
-          </a:p>
-        </p:txBody>
-      </p:sp>
-      <p:sp>
-        <p:nvSpPr>
-          <p:cNvPr id="8" name="TextBox 7">
-            <a:extLst>
-              <a:ext uri="{FF2B5EF4-FFF2-40B4-BE49-F238E27FC236}">
-                <a16:creationId xmlns:a16="http://schemas.microsoft.com/office/drawing/2014/main" id="{3804DF01-C511-ED65-9989-F44F7AB2163E}"/>
-              </a:ext>
-            </a:extLst>
-          </p:cNvPr>
-          <p:cNvSpPr txBox="1"/>
-          <p:nvPr/>
-        </p:nvSpPr>
-        <p:spPr>
-          <a:xfrm>
-            <a:off x="2791526" y="4397978"/>
-            <a:ext cx="895502" cy="369332"/>
-          </a:xfrm>
-          <a:prstGeom prst="rect">
-            <a:avLst/>
-          </a:prstGeom>
-          <a:noFill/>
-        </p:spPr>
-        <p:txBody>
-          <a:bodyPr wrap="none" rtlCol="0">
-            <a:spAutoFit/>
-          </a:bodyPr>
-          <a:lstStyle/>
-          <a:p>
-            <a:r>
-              <a:rPr lang="en-US" dirty="0"/>
-              <a:t>owlcms</a:t>
-            </a:r>
-          </a:p>
-        </p:txBody>
-      </p:sp>
-      <p:pic>
-        <p:nvPicPr>
-          <p:cNvPr id="9" name="Graphic 8" descr="Server">
-            <a:extLst>
-              <a:ext uri="{FF2B5EF4-FFF2-40B4-BE49-F238E27FC236}">
-                <a16:creationId xmlns:a16="http://schemas.microsoft.com/office/drawing/2014/main" id="{AAF7C389-8642-68AD-DDAC-86107A02F164}"/>
-              </a:ext>
-            </a:extLst>
-          </p:cNvPr>
-          <p:cNvPicPr>
-            <a:picLocks noChangeAspect="1"/>
-          </p:cNvPicPr>
-          <p:nvPr/>
-        </p:nvPicPr>
-        <p:blipFill>
-          <a:blip r:embed="rId6">
-            <a:extLst>
-              <a:ext uri="{28A0092B-C50C-407E-A947-70E740481C1C}">
-                <a14:useLocalDpi xmlns:a14="http://schemas.microsoft.com/office/drawing/2010/main" val="0"/>
-              </a:ext>
-              <a:ext uri="{96DAC541-7B7A-43D3-8B79-37D633B846F1}">
-                <asvg:svgBlip xmlns:asvg="http://schemas.microsoft.com/office/drawing/2016/SVG/main" r:embed="rId7"/>
-              </a:ext>
-            </a:extLst>
-          </a:blip>
-          <a:stretch>
-            <a:fillRect/>
-          </a:stretch>
-        </p:blipFill>
-        <p:spPr>
-          <a:xfrm>
-            <a:off x="2846586" y="3664970"/>
-            <a:ext cx="914400" cy="914400"/>
-          </a:xfrm>
-          <a:prstGeom prst="rect">
-            <a:avLst/>
-          </a:prstGeom>
-        </p:spPr>
-      </p:pic>
-      <p:sp>
-        <p:nvSpPr>
-          <p:cNvPr id="10" name="TextBox 9">
-            <a:extLst>
-              <a:ext uri="{FF2B5EF4-FFF2-40B4-BE49-F238E27FC236}">
-                <a16:creationId xmlns:a16="http://schemas.microsoft.com/office/drawing/2014/main" id="{EF31240E-65D8-199E-85D1-677B4950C62B}"/>
-              </a:ext>
-            </a:extLst>
-          </p:cNvPr>
-          <p:cNvSpPr txBox="1"/>
-          <p:nvPr/>
-        </p:nvSpPr>
-        <p:spPr>
-          <a:xfrm>
-            <a:off x="963286" y="5104505"/>
-            <a:ext cx="1220206" cy="369332"/>
-          </a:xfrm>
-          <a:prstGeom prst="rect">
-            <a:avLst/>
-          </a:prstGeom>
-          <a:noFill/>
-        </p:spPr>
-        <p:txBody>
-          <a:bodyPr wrap="none" rtlCol="0">
-            <a:spAutoFit/>
-          </a:bodyPr>
-          <a:lstStyle/>
-          <a:p>
-            <a:r>
-              <a:rPr lang="en-US" dirty="0"/>
-              <a:t>Announcer</a:t>
-            </a:r>
-          </a:p>
-        </p:txBody>
-      </p:sp>
-      <p:pic>
-        <p:nvPicPr>
-          <p:cNvPr id="11" name="Graphic 10" descr="Laptop">
-            <a:extLst>
-              <a:ext uri="{FF2B5EF4-FFF2-40B4-BE49-F238E27FC236}">
-                <a16:creationId xmlns:a16="http://schemas.microsoft.com/office/drawing/2014/main" id="{032C1AB0-6E58-5751-7C29-79736D414132}"/>
-              </a:ext>
-            </a:extLst>
-          </p:cNvPr>
-          <p:cNvPicPr>
-            <a:picLocks noChangeAspect="1"/>
-          </p:cNvPicPr>
-          <p:nvPr/>
-        </p:nvPicPr>
-        <p:blipFill>
-          <a:blip r:embed="rId8">
-            <a:extLst>
-              <a:ext uri="{28A0092B-C50C-407E-A947-70E740481C1C}">
-                <a14:useLocalDpi xmlns:a14="http://schemas.microsoft.com/office/drawing/2010/main" val="0"/>
-              </a:ext>
-              <a:ext uri="{96DAC541-7B7A-43D3-8B79-37D633B846F1}">
-                <asvg:svgBlip xmlns:asvg="http://schemas.microsoft.com/office/drawing/2016/SVG/main" r:embed="rId9"/>
-              </a:ext>
-            </a:extLst>
-          </a:blip>
-          <a:stretch>
-            <a:fillRect/>
-          </a:stretch>
-        </p:blipFill>
-        <p:spPr>
-          <a:xfrm>
-            <a:off x="1087711" y="4456043"/>
-            <a:ext cx="914400" cy="914400"/>
-          </a:xfrm>
-          <a:prstGeom prst="rect">
-            <a:avLst/>
-          </a:prstGeom>
-        </p:spPr>
-      </p:pic>
-      <p:sp>
-        <p:nvSpPr>
-          <p:cNvPr id="4" name="TextBox 3">
-            <a:extLst>
-              <a:ext uri="{FF2B5EF4-FFF2-40B4-BE49-F238E27FC236}">
-                <a16:creationId xmlns:a16="http://schemas.microsoft.com/office/drawing/2014/main" id="{12E2FA3B-EEE8-2FBB-5119-D4BBC41C4B96}"/>
-              </a:ext>
-            </a:extLst>
-          </p:cNvPr>
-          <p:cNvSpPr txBox="1"/>
-          <p:nvPr/>
-        </p:nvSpPr>
-        <p:spPr>
-          <a:xfrm>
-            <a:off x="285498" y="5617520"/>
-            <a:ext cx="2484016" cy="369332"/>
-          </a:xfrm>
-          <a:prstGeom prst="rect">
-            <a:avLst/>
-          </a:prstGeom>
-          <a:noFill/>
-        </p:spPr>
-        <p:txBody>
-          <a:bodyPr wrap="square" rtlCol="0">
-            <a:spAutoFit/>
-          </a:bodyPr>
-          <a:lstStyle/>
-          <a:p>
-            <a:r>
-              <a:rPr lang="en-US" i="1" dirty="0"/>
-              <a:t>Competition Site</a:t>
-            </a:r>
-          </a:p>
-        </p:txBody>
-      </p:sp>
-      <p:pic>
-        <p:nvPicPr>
-          <p:cNvPr id="13" name="Graphic 12" descr="Laptop">
-            <a:extLst>
-              <a:ext uri="{FF2B5EF4-FFF2-40B4-BE49-F238E27FC236}">
-                <a16:creationId xmlns:a16="http://schemas.microsoft.com/office/drawing/2014/main" id="{77D50B0C-A067-74C7-6962-7CFB05FEE07B}"/>
-              </a:ext>
-            </a:extLst>
-          </p:cNvPr>
-          <p:cNvPicPr>
-            <a:picLocks noChangeAspect="1"/>
-          </p:cNvPicPr>
-          <p:nvPr/>
-        </p:nvPicPr>
-        <p:blipFill>
-          <a:blip r:embed="rId10">
-            <a:extLst>
-              <a:ext uri="{28A0092B-C50C-407E-A947-70E740481C1C}">
-                <a14:useLocalDpi xmlns:a14="http://schemas.microsoft.com/office/drawing/2010/main" val="0"/>
-              </a:ext>
-              <a:ext uri="{96DAC541-7B7A-43D3-8B79-37D633B846F1}">
-                <asvg:svgBlip xmlns:asvg="http://schemas.microsoft.com/office/drawing/2016/SVG/main" r:embed="rId11"/>
-              </a:ext>
-            </a:extLst>
-          </a:blip>
-          <a:stretch>
-            <a:fillRect/>
-          </a:stretch>
-        </p:blipFill>
-        <p:spPr>
-          <a:xfrm>
-            <a:off x="418575" y="921360"/>
-            <a:ext cx="914400" cy="914400"/>
-          </a:xfrm>
-          <a:prstGeom prst="rect">
-            <a:avLst/>
-          </a:prstGeom>
-        </p:spPr>
-      </p:pic>
-      <p:pic>
-        <p:nvPicPr>
-          <p:cNvPr id="14" name="Graphic 13" descr="Laptop">
-            <a:extLst>
-              <a:ext uri="{FF2B5EF4-FFF2-40B4-BE49-F238E27FC236}">
-                <a16:creationId xmlns:a16="http://schemas.microsoft.com/office/drawing/2014/main" id="{D289C601-50FF-702F-4773-41130CA27D58}"/>
-              </a:ext>
-            </a:extLst>
-          </p:cNvPr>
-          <p:cNvPicPr>
-            <a:picLocks noChangeAspect="1"/>
-          </p:cNvPicPr>
-          <p:nvPr/>
-        </p:nvPicPr>
-        <p:blipFill>
-          <a:blip r:embed="rId10">
-            <a:extLst>
-              <a:ext uri="{28A0092B-C50C-407E-A947-70E740481C1C}">
-                <a14:useLocalDpi xmlns:a14="http://schemas.microsoft.com/office/drawing/2010/main" val="0"/>
-              </a:ext>
-              <a:ext uri="{96DAC541-7B7A-43D3-8B79-37D633B846F1}">
-                <asvg:svgBlip xmlns:asvg="http://schemas.microsoft.com/office/drawing/2016/SVG/main" r:embed="rId11"/>
-              </a:ext>
-            </a:extLst>
-          </a:blip>
-          <a:stretch>
-            <a:fillRect/>
-          </a:stretch>
-        </p:blipFill>
-        <p:spPr>
-          <a:xfrm>
-            <a:off x="1573858" y="926226"/>
-            <a:ext cx="914400" cy="914400"/>
-          </a:xfrm>
-          <a:prstGeom prst="rect">
-            <a:avLst/>
-          </a:prstGeom>
-        </p:spPr>
-      </p:pic>
-      <p:sp>
-        <p:nvSpPr>
-          <p:cNvPr id="16" name="TextBox 15">
-            <a:extLst>
-              <a:ext uri="{FF2B5EF4-FFF2-40B4-BE49-F238E27FC236}">
-                <a16:creationId xmlns:a16="http://schemas.microsoft.com/office/drawing/2014/main" id="{C86FB194-B2DD-3F2F-F889-A078DD93B5DA}"/>
-              </a:ext>
-            </a:extLst>
-          </p:cNvPr>
-          <p:cNvSpPr txBox="1"/>
-          <p:nvPr/>
-        </p:nvSpPr>
-        <p:spPr>
-          <a:xfrm>
-            <a:off x="1027765" y="766481"/>
-            <a:ext cx="942887" cy="369332"/>
-          </a:xfrm>
-          <a:prstGeom prst="rect">
-            <a:avLst/>
-          </a:prstGeom>
-          <a:noFill/>
-        </p:spPr>
-        <p:txBody>
-          <a:bodyPr wrap="none" rtlCol="0">
-            <a:spAutoFit/>
-          </a:bodyPr>
-          <a:lstStyle/>
-          <a:p>
-            <a:r>
-              <a:rPr lang="en-US" dirty="0"/>
-              <a:t>Displays</a:t>
-            </a:r>
-          </a:p>
-        </p:txBody>
-      </p:sp>
-    </p:spTree>
-    <p:extLst>
-      <p:ext uri="{BB962C8B-B14F-4D97-AF65-F5344CB8AC3E}">
-        <p14:creationId xmlns:p14="http://schemas.microsoft.com/office/powerpoint/2010/main" val="2097706456"/>
-      </p:ext>
-    </p:extLst>
-  </p:cSld>
-  <p:clrMapOvr>
-    <a:masterClrMapping/>
-  </p:clrMapOvr>
-</p:sld>
-</file>
-
-<file path=ppt/slides/slide3.xml><?xml version="1.0" encoding="utf-8"?>
-<p:sld xmlns:a="http://schemas.openxmlformats.org/drawingml/2006/main" xmlns:r="http://schemas.openxmlformats.org/officeDocument/2006/relationships" xmlns:p="http://schemas.openxmlformats.org/presentationml/2006/main">
-  <p:cSld>
-    <p:spTree>
-      <p:nvGrpSpPr>
-        <p:cNvPr id="1" name=""/>
-        <p:cNvGrpSpPr/>
-        <p:nvPr/>
-      </p:nvGrpSpPr>
-      <p:grpSpPr>
-        <a:xfrm>
-          <a:off x="0" y="0"/>
-          <a:ext cx="0" cy="0"/>
-          <a:chOff x="0" y="0"/>
-          <a:chExt cx="0" cy="0"/>
-        </a:xfrm>
-      </p:grpSpPr>
-      <p:pic>
-        <p:nvPicPr>
-          <p:cNvPr id="15" name="Graphic 14" descr="Smart Phone">
-            <a:extLst>
-              <a:ext uri="{FF2B5EF4-FFF2-40B4-BE49-F238E27FC236}">
-                <a16:creationId xmlns:a16="http://schemas.microsoft.com/office/drawing/2014/main" id="{B26F2D9A-0389-4F5E-9CE3-76AE6DBD72D8}"/>
-              </a:ext>
-            </a:extLst>
-          </p:cNvPr>
-          <p:cNvPicPr>
-            <a:picLocks noChangeAspect="1"/>
-          </p:cNvPicPr>
-          <p:nvPr/>
-        </p:nvPicPr>
-        <p:blipFill>
-          <a:blip r:embed="rId2">
-            <a:extLst>
-              <a:ext uri="{28A0092B-C50C-407E-A947-70E740481C1C}">
-                <a14:useLocalDpi xmlns:a14="http://schemas.microsoft.com/office/drawing/2010/main" val="0"/>
-              </a:ext>
-              <a:ext uri="{96DAC541-7B7A-43D3-8B79-37D633B846F1}">
-                <asvg:svgBlip xmlns:asvg="http://schemas.microsoft.com/office/drawing/2016/SVG/main" r:embed="rId3"/>
-              </a:ext>
-            </a:extLst>
-          </a:blip>
-          <a:stretch>
-            <a:fillRect/>
-          </a:stretch>
-        </p:blipFill>
-        <p:spPr>
-          <a:xfrm>
-            <a:off x="651819" y="2811608"/>
-            <a:ext cx="457200" cy="457200"/>
-          </a:xfrm>
-          <a:prstGeom prst="rect">
-            <a:avLst/>
-          </a:prstGeom>
-        </p:spPr>
-      </p:pic>
-      <p:pic>
-        <p:nvPicPr>
-          <p:cNvPr id="18" name="Graphic 17" descr="Smart Phone">
-            <a:extLst>
-              <a:ext uri="{FF2B5EF4-FFF2-40B4-BE49-F238E27FC236}">
-                <a16:creationId xmlns:a16="http://schemas.microsoft.com/office/drawing/2014/main" id="{A68D5361-5BF4-4832-A4CD-48D24331CBA2}"/>
-              </a:ext>
-            </a:extLst>
-          </p:cNvPr>
-          <p:cNvPicPr>
-            <a:picLocks noChangeAspect="1"/>
-          </p:cNvPicPr>
-          <p:nvPr/>
-        </p:nvPicPr>
-        <p:blipFill>
-          <a:blip r:embed="rId2">
-            <a:extLst>
-              <a:ext uri="{28A0092B-C50C-407E-A947-70E740481C1C}">
-                <a14:useLocalDpi xmlns:a14="http://schemas.microsoft.com/office/drawing/2010/main" val="0"/>
-              </a:ext>
-              <a:ext uri="{96DAC541-7B7A-43D3-8B79-37D633B846F1}">
-                <asvg:svgBlip xmlns:asvg="http://schemas.microsoft.com/office/drawing/2016/SVG/main" r:embed="rId3"/>
-              </a:ext>
-            </a:extLst>
-          </a:blip>
-          <a:stretch>
-            <a:fillRect/>
-          </a:stretch>
-        </p:blipFill>
-        <p:spPr>
-          <a:xfrm>
-            <a:off x="1166210" y="2811608"/>
-            <a:ext cx="457200" cy="457200"/>
-          </a:xfrm>
-          <a:prstGeom prst="rect">
-            <a:avLst/>
-          </a:prstGeom>
-        </p:spPr>
-      </p:pic>
-      <p:pic>
-        <p:nvPicPr>
-          <p:cNvPr id="19" name="Graphic 18" descr="Smart Phone">
-            <a:extLst>
-              <a:ext uri="{FF2B5EF4-FFF2-40B4-BE49-F238E27FC236}">
-                <a16:creationId xmlns:a16="http://schemas.microsoft.com/office/drawing/2014/main" id="{A4F2E9AB-1654-42A4-96CE-56E364489C90}"/>
-              </a:ext>
-            </a:extLst>
-          </p:cNvPr>
-          <p:cNvPicPr>
-            <a:picLocks noChangeAspect="1"/>
-          </p:cNvPicPr>
-          <p:nvPr/>
-        </p:nvPicPr>
-        <p:blipFill>
-          <a:blip r:embed="rId2">
-            <a:extLst>
-              <a:ext uri="{28A0092B-C50C-407E-A947-70E740481C1C}">
-                <a14:useLocalDpi xmlns:a14="http://schemas.microsoft.com/office/drawing/2010/main" val="0"/>
-              </a:ext>
-              <a:ext uri="{96DAC541-7B7A-43D3-8B79-37D633B846F1}">
-                <asvg:svgBlip xmlns:asvg="http://schemas.microsoft.com/office/drawing/2016/SVG/main" r:embed="rId3"/>
-              </a:ext>
-            </a:extLst>
-          </a:blip>
-          <a:stretch>
-            <a:fillRect/>
-          </a:stretch>
-        </p:blipFill>
-        <p:spPr>
-          <a:xfrm>
-            <a:off x="1602953" y="2811608"/>
-            <a:ext cx="457200" cy="457200"/>
-          </a:xfrm>
-          <a:prstGeom prst="rect">
-            <a:avLst/>
-          </a:prstGeom>
-        </p:spPr>
-      </p:pic>
-      <p:cxnSp>
-        <p:nvCxnSpPr>
-          <p:cNvPr id="67" name="Connector: Curved 66">
-            <a:extLst>
-              <a:ext uri="{FF2B5EF4-FFF2-40B4-BE49-F238E27FC236}">
-                <a16:creationId xmlns:a16="http://schemas.microsoft.com/office/drawing/2014/main" id="{3CC4C0E7-8A33-456E-AB9A-19F7E746862F}"/>
-              </a:ext>
-            </a:extLst>
-          </p:cNvPr>
-          <p:cNvCxnSpPr>
-            <a:cxnSpLocks/>
-            <a:stCxn id="19" idx="2"/>
-          </p:cNvCxnSpPr>
-          <p:nvPr/>
-        </p:nvCxnSpPr>
-        <p:spPr>
-          <a:xfrm rot="16200000" flipH="1">
-            <a:off x="1891668" y="3208692"/>
-            <a:ext cx="844910" cy="965141"/>
-          </a:xfrm>
-          <a:prstGeom prst="curvedConnector2">
-            <a:avLst/>
-          </a:prstGeom>
-          <a:ln>
-            <a:headEnd type="triangle"/>
-            <a:tailEnd type="triangle"/>
-          </a:ln>
-        </p:spPr>
-        <p:style>
-          <a:lnRef idx="1">
-            <a:schemeClr val="accent1"/>
-          </a:lnRef>
-          <a:fillRef idx="0">
-            <a:schemeClr val="accent1"/>
-          </a:fillRef>
-          <a:effectRef idx="0">
-            <a:schemeClr val="accent1"/>
-          </a:effectRef>
-          <a:fontRef idx="minor">
-            <a:schemeClr val="tx1"/>
-          </a:fontRef>
-        </p:style>
-      </p:cxnSp>
-      <p:cxnSp>
-        <p:nvCxnSpPr>
-          <p:cNvPr id="69" name="Connector: Curved 68">
-            <a:extLst>
-              <a:ext uri="{FF2B5EF4-FFF2-40B4-BE49-F238E27FC236}">
-                <a16:creationId xmlns:a16="http://schemas.microsoft.com/office/drawing/2014/main" id="{B868B35F-7240-464D-8632-09E3BE0AA964}"/>
-              </a:ext>
-            </a:extLst>
-          </p:cNvPr>
-          <p:cNvCxnSpPr>
-            <a:cxnSpLocks/>
-            <a:stCxn id="18" idx="2"/>
-          </p:cNvCxnSpPr>
-          <p:nvPr/>
-        </p:nvCxnSpPr>
-        <p:spPr>
-          <a:xfrm rot="16200000" flipH="1">
-            <a:off x="1673297" y="2990321"/>
-            <a:ext cx="844910" cy="1401884"/>
-          </a:xfrm>
-          <a:prstGeom prst="curvedConnector2">
-            <a:avLst/>
-          </a:prstGeom>
-          <a:ln>
-            <a:headEnd type="triangle"/>
-            <a:tailEnd type="triangle"/>
-          </a:ln>
-        </p:spPr>
-        <p:style>
-          <a:lnRef idx="1">
-            <a:schemeClr val="accent1"/>
-          </a:lnRef>
-          <a:fillRef idx="0">
-            <a:schemeClr val="accent1"/>
-          </a:fillRef>
-          <a:effectRef idx="0">
-            <a:schemeClr val="accent1"/>
-          </a:effectRef>
-          <a:fontRef idx="minor">
-            <a:schemeClr val="tx1"/>
-          </a:fontRef>
-        </p:style>
-      </p:cxnSp>
-      <p:cxnSp>
-        <p:nvCxnSpPr>
-          <p:cNvPr id="71" name="Connector: Curved 70">
-            <a:extLst>
-              <a:ext uri="{FF2B5EF4-FFF2-40B4-BE49-F238E27FC236}">
-                <a16:creationId xmlns:a16="http://schemas.microsoft.com/office/drawing/2014/main" id="{F4029B8D-7D2F-4A22-8BE2-A243426A9C77}"/>
-              </a:ext>
-            </a:extLst>
-          </p:cNvPr>
-          <p:cNvCxnSpPr>
-            <a:cxnSpLocks/>
-            <a:stCxn id="15" idx="2"/>
-          </p:cNvCxnSpPr>
-          <p:nvPr/>
-        </p:nvCxnSpPr>
-        <p:spPr>
-          <a:xfrm rot="16200000" flipH="1">
-            <a:off x="1416101" y="2733125"/>
-            <a:ext cx="844910" cy="1916275"/>
-          </a:xfrm>
-          <a:prstGeom prst="curvedConnector2">
-            <a:avLst/>
-          </a:prstGeom>
-          <a:ln>
-            <a:headEnd type="triangle"/>
-            <a:tailEnd type="triangle"/>
-          </a:ln>
-        </p:spPr>
-        <p:style>
-          <a:lnRef idx="1">
-            <a:schemeClr val="accent1"/>
-          </a:lnRef>
-          <a:fillRef idx="0">
-            <a:schemeClr val="accent1"/>
-          </a:fillRef>
-          <a:effectRef idx="0">
-            <a:schemeClr val="accent1"/>
-          </a:effectRef>
-          <a:fontRef idx="minor">
-            <a:schemeClr val="tx1"/>
-          </a:fontRef>
-        </p:style>
-      </p:cxnSp>
-      <p:cxnSp>
-        <p:nvCxnSpPr>
-          <p:cNvPr id="121" name="Connector: Curved 120">
-            <a:extLst>
-              <a:ext uri="{FF2B5EF4-FFF2-40B4-BE49-F238E27FC236}">
-                <a16:creationId xmlns:a16="http://schemas.microsoft.com/office/drawing/2014/main" id="{7F9B236A-46B9-4CAA-9E1E-846355322AEF}"/>
-              </a:ext>
-            </a:extLst>
-          </p:cNvPr>
-          <p:cNvCxnSpPr>
-            <a:cxnSpLocks/>
-          </p:cNvCxnSpPr>
-          <p:nvPr/>
-        </p:nvCxnSpPr>
-        <p:spPr>
-          <a:xfrm rot="16200000" flipV="1">
-            <a:off x="1576356" y="2403359"/>
-            <a:ext cx="1909906" cy="716073"/>
-          </a:xfrm>
-          <a:prstGeom prst="curvedConnector3">
-            <a:avLst>
-              <a:gd name="adj1" fmla="val 68518"/>
-            </a:avLst>
-          </a:prstGeom>
-          <a:ln>
-            <a:tailEnd type="triangle"/>
-          </a:ln>
-        </p:spPr>
-        <p:style>
-          <a:lnRef idx="1">
-            <a:schemeClr val="accent1"/>
-          </a:lnRef>
-          <a:fillRef idx="0">
-            <a:schemeClr val="accent1"/>
-          </a:fillRef>
-          <a:effectRef idx="0">
-            <a:schemeClr val="accent1"/>
-          </a:effectRef>
-          <a:fontRef idx="minor">
-            <a:schemeClr val="tx1"/>
-          </a:fontRef>
-        </p:style>
-      </p:cxnSp>
-      <p:cxnSp>
-        <p:nvCxnSpPr>
-          <p:cNvPr id="124" name="Connector: Curved 123">
-            <a:extLst>
-              <a:ext uri="{FF2B5EF4-FFF2-40B4-BE49-F238E27FC236}">
-                <a16:creationId xmlns:a16="http://schemas.microsoft.com/office/drawing/2014/main" id="{53FE312B-72AD-4E57-A253-2FFF7B5C59D1}"/>
-              </a:ext>
-            </a:extLst>
-          </p:cNvPr>
-          <p:cNvCxnSpPr>
-            <a:cxnSpLocks/>
-          </p:cNvCxnSpPr>
-          <p:nvPr/>
-        </p:nvCxnSpPr>
-        <p:spPr>
-          <a:xfrm rot="16200000" flipV="1">
-            <a:off x="987418" y="1844098"/>
-            <a:ext cx="1950673" cy="1875367"/>
-          </a:xfrm>
-          <a:prstGeom prst="curvedConnector3">
-            <a:avLst>
-              <a:gd name="adj1" fmla="val 61940"/>
-            </a:avLst>
-          </a:prstGeom>
-          <a:ln>
-            <a:tailEnd type="triangle"/>
-          </a:ln>
-        </p:spPr>
-        <p:style>
-          <a:lnRef idx="1">
-            <a:schemeClr val="accent1"/>
-          </a:lnRef>
-          <a:fillRef idx="0">
-            <a:schemeClr val="accent1"/>
-          </a:fillRef>
-          <a:effectRef idx="0">
-            <a:schemeClr val="accent1"/>
-          </a:effectRef>
-          <a:fontRef idx="minor">
-            <a:schemeClr val="tx1"/>
-          </a:fontRef>
-        </p:style>
-      </p:cxnSp>
-      <p:cxnSp>
-        <p:nvCxnSpPr>
-          <p:cNvPr id="135" name="Straight Arrow Connector 134">
-            <a:extLst>
-              <a:ext uri="{FF2B5EF4-FFF2-40B4-BE49-F238E27FC236}">
-                <a16:creationId xmlns:a16="http://schemas.microsoft.com/office/drawing/2014/main" id="{E3D4809F-46F2-45AB-9212-B21139D1E38C}"/>
-              </a:ext>
-            </a:extLst>
-          </p:cNvPr>
-          <p:cNvCxnSpPr>
-            <a:cxnSpLocks/>
-          </p:cNvCxnSpPr>
-          <p:nvPr/>
-        </p:nvCxnSpPr>
-        <p:spPr>
-          <a:xfrm>
-            <a:off x="3699330" y="4113718"/>
-            <a:ext cx="945839" cy="0"/>
-          </a:xfrm>
-          <a:prstGeom prst="straightConnector1">
-            <a:avLst/>
-          </a:prstGeom>
-          <a:ln w="53975">
-            <a:tailEnd type="triangle"/>
-          </a:ln>
-        </p:spPr>
-        <p:style>
-          <a:lnRef idx="1">
-            <a:schemeClr val="accent1"/>
-          </a:lnRef>
-          <a:fillRef idx="0">
-            <a:schemeClr val="accent1"/>
-          </a:fillRef>
-          <a:effectRef idx="0">
-            <a:schemeClr val="accent1"/>
-          </a:effectRef>
-          <a:fontRef idx="minor">
-            <a:schemeClr val="tx1"/>
-          </a:fontRef>
-        </p:style>
-      </p:cxnSp>
-      <p:sp>
-        <p:nvSpPr>
-          <p:cNvPr id="141" name="TextBox 140">
-            <a:extLst>
-              <a:ext uri="{FF2B5EF4-FFF2-40B4-BE49-F238E27FC236}">
-                <a16:creationId xmlns:a16="http://schemas.microsoft.com/office/drawing/2014/main" id="{FDFA73C4-2863-4475-A7A2-353585C96372}"/>
-              </a:ext>
-            </a:extLst>
-          </p:cNvPr>
-          <p:cNvSpPr txBox="1"/>
-          <p:nvPr/>
-        </p:nvSpPr>
-        <p:spPr>
-          <a:xfrm>
-            <a:off x="4335825" y="4433612"/>
-            <a:ext cx="1377493" cy="369332"/>
-          </a:xfrm>
-          <a:prstGeom prst="rect">
-            <a:avLst/>
-          </a:prstGeom>
-          <a:noFill/>
-        </p:spPr>
-        <p:txBody>
-          <a:bodyPr wrap="square" rtlCol="0">
-            <a:spAutoFit/>
-          </a:bodyPr>
-          <a:lstStyle/>
-          <a:p>
-            <a:r>
-              <a:rPr lang="en-US" dirty="0"/>
-              <a:t>publicresults</a:t>
-            </a:r>
-          </a:p>
-        </p:txBody>
-      </p:sp>
-      <p:cxnSp>
-        <p:nvCxnSpPr>
-          <p:cNvPr id="143" name="Connector: Curved 142">
-            <a:extLst>
-              <a:ext uri="{FF2B5EF4-FFF2-40B4-BE49-F238E27FC236}">
-                <a16:creationId xmlns:a16="http://schemas.microsoft.com/office/drawing/2014/main" id="{EA06EC34-A278-408E-A58E-B30BBF510876}"/>
-              </a:ext>
-            </a:extLst>
-          </p:cNvPr>
-          <p:cNvCxnSpPr>
-            <a:cxnSpLocks/>
-            <a:endCxn id="45" idx="2"/>
-          </p:cNvCxnSpPr>
-          <p:nvPr/>
-        </p:nvCxnSpPr>
-        <p:spPr>
-          <a:xfrm rot="5400000" flipH="1" flipV="1">
-            <a:off x="4365388" y="3013064"/>
-            <a:ext cx="1337383" cy="19018"/>
-          </a:xfrm>
-          <a:prstGeom prst="curvedConnector3">
-            <a:avLst>
-              <a:gd name="adj1" fmla="val 50000"/>
-            </a:avLst>
-          </a:prstGeom>
-          <a:ln>
-            <a:tailEnd type="triangle"/>
-          </a:ln>
-        </p:spPr>
-        <p:style>
-          <a:lnRef idx="1">
-            <a:schemeClr val="accent1"/>
-          </a:lnRef>
-          <a:fillRef idx="0">
-            <a:schemeClr val="accent1"/>
-          </a:fillRef>
-          <a:effectRef idx="0">
-            <a:schemeClr val="accent1"/>
-          </a:effectRef>
-          <a:fontRef idx="minor">
-            <a:schemeClr val="tx1"/>
-          </a:fontRef>
-        </p:style>
-      </p:cxnSp>
-      <p:pic>
-        <p:nvPicPr>
-          <p:cNvPr id="6" name="Graphic 5" descr="Smart Phone">
-            <a:extLst>
-              <a:ext uri="{FF2B5EF4-FFF2-40B4-BE49-F238E27FC236}">
-                <a16:creationId xmlns:a16="http://schemas.microsoft.com/office/drawing/2014/main" id="{BED10CFA-E443-9C81-0F68-A9E8C92D5B0A}"/>
-              </a:ext>
-            </a:extLst>
-          </p:cNvPr>
-          <p:cNvPicPr>
-            <a:picLocks noChangeAspect="1"/>
-          </p:cNvPicPr>
-          <p:nvPr/>
-        </p:nvPicPr>
-        <p:blipFill>
-          <a:blip r:embed="rId2">
-            <a:extLst>
-              <a:ext uri="{28A0092B-C50C-407E-A947-70E740481C1C}">
-                <a14:useLocalDpi xmlns:a14="http://schemas.microsoft.com/office/drawing/2010/main" val="0"/>
-              </a:ext>
-              <a:ext uri="{96DAC541-7B7A-43D3-8B79-37D633B846F1}">
-                <asvg:svgBlip xmlns:asvg="http://schemas.microsoft.com/office/drawing/2016/SVG/main" r:embed="rId3"/>
-              </a:ext>
-            </a:extLst>
-          </a:blip>
-          <a:stretch>
-            <a:fillRect/>
-          </a:stretch>
-        </p:blipFill>
-        <p:spPr>
-          <a:xfrm>
-            <a:off x="4795971" y="1316174"/>
-            <a:ext cx="457200" cy="457200"/>
-          </a:xfrm>
-          <a:prstGeom prst="rect">
-            <a:avLst/>
-          </a:prstGeom>
-        </p:spPr>
-      </p:pic>
-      <p:sp>
-        <p:nvSpPr>
-          <p:cNvPr id="45" name="TextBox 44">
-            <a:extLst>
-              <a:ext uri="{FF2B5EF4-FFF2-40B4-BE49-F238E27FC236}">
-                <a16:creationId xmlns:a16="http://schemas.microsoft.com/office/drawing/2014/main" id="{F4AB2A22-B940-7C0F-21F5-630FF00120BD}"/>
-              </a:ext>
-            </a:extLst>
-          </p:cNvPr>
-          <p:cNvSpPr txBox="1"/>
-          <p:nvPr/>
-        </p:nvSpPr>
-        <p:spPr>
-          <a:xfrm>
-            <a:off x="4623440" y="1776800"/>
-            <a:ext cx="840295" cy="577081"/>
-          </a:xfrm>
-          <a:prstGeom prst="rect">
-            <a:avLst/>
-          </a:prstGeom>
-          <a:noFill/>
-        </p:spPr>
-        <p:txBody>
-          <a:bodyPr wrap="square" rtlCol="0">
-            <a:spAutoFit/>
-          </a:bodyPr>
-          <a:lstStyle/>
-          <a:p>
-            <a:pPr algn="ctr"/>
-            <a:r>
-              <a:rPr lang="en-US" sz="1050" dirty="0"/>
-              <a:t>Internet-accessed</a:t>
-            </a:r>
-            <a:br>
-              <a:rPr lang="en-US" sz="1050" dirty="0"/>
-            </a:br>
-            <a:r>
-              <a:rPr lang="en-US" sz="1050" dirty="0"/>
-              <a:t>Scoreboard</a:t>
-            </a:r>
-          </a:p>
-        </p:txBody>
-      </p:sp>
-      <p:pic>
-        <p:nvPicPr>
-          <p:cNvPr id="50" name="Graphic 49" descr="Server">
-            <a:extLst>
-              <a:ext uri="{FF2B5EF4-FFF2-40B4-BE49-F238E27FC236}">
-                <a16:creationId xmlns:a16="http://schemas.microsoft.com/office/drawing/2014/main" id="{B8C8395B-044C-245A-B324-865A6E687529}"/>
-              </a:ext>
-            </a:extLst>
-          </p:cNvPr>
-          <p:cNvPicPr>
-            <a:picLocks noChangeAspect="1"/>
-          </p:cNvPicPr>
-          <p:nvPr/>
-        </p:nvPicPr>
-        <p:blipFill>
-          <a:blip r:embed="rId4">
-            <a:extLst>
-              <a:ext uri="{28A0092B-C50C-407E-A947-70E740481C1C}">
-                <a14:useLocalDpi xmlns:a14="http://schemas.microsoft.com/office/drawing/2010/main" val="0"/>
-              </a:ext>
-              <a:ext uri="{96DAC541-7B7A-43D3-8B79-37D633B846F1}">
-                <asvg:svgBlip xmlns:asvg="http://schemas.microsoft.com/office/drawing/2016/SVG/main" r:embed="rId5"/>
-              </a:ext>
-            </a:extLst>
-          </a:blip>
-          <a:stretch>
-            <a:fillRect/>
-          </a:stretch>
-        </p:blipFill>
-        <p:spPr>
-          <a:xfrm>
-            <a:off x="4589183" y="3656518"/>
-            <a:ext cx="914400" cy="914400"/>
-          </a:xfrm>
-          <a:prstGeom prst="rect">
-            <a:avLst/>
-          </a:prstGeom>
-        </p:spPr>
-      </p:pic>
-      <p:sp>
-        <p:nvSpPr>
-          <p:cNvPr id="2" name="Rectangle 1">
-            <a:extLst>
-              <a:ext uri="{FF2B5EF4-FFF2-40B4-BE49-F238E27FC236}">
-                <a16:creationId xmlns:a16="http://schemas.microsoft.com/office/drawing/2014/main" id="{F5100FEA-6C24-1222-FB4A-4EF6532145B6}"/>
-              </a:ext>
-            </a:extLst>
-          </p:cNvPr>
-          <p:cNvSpPr/>
-          <p:nvPr/>
-        </p:nvSpPr>
-        <p:spPr>
-          <a:xfrm>
-            <a:off x="298581" y="501110"/>
-            <a:ext cx="3516861" cy="5492108"/>
-          </a:xfrm>
-          <a:prstGeom prst="rect">
-            <a:avLst/>
-          </a:prstGeom>
-          <a:noFill/>
-        </p:spPr>
-        <p:style>
-          <a:lnRef idx="2">
-            <a:schemeClr val="accent1">
-              <a:shade val="50000"/>
-            </a:schemeClr>
-          </a:lnRef>
-          <a:fillRef idx="1">
-            <a:schemeClr val="accent1"/>
-          </a:fillRef>
-          <a:effectRef idx="0">
-            <a:schemeClr val="accent1"/>
-          </a:effectRef>
-          <a:fontRef idx="minor">
-            <a:schemeClr val="lt1"/>
-          </a:fontRef>
-        </p:style>
-        <p:txBody>
-          <a:bodyPr rtlCol="0" anchor="ctr"/>
-          <a:lstStyle/>
-          <a:p>
-            <a:pPr algn="ctr"/>
-            <a:endParaRPr lang="en-US" dirty="0"/>
-          </a:p>
-        </p:txBody>
-      </p:sp>
-      <p:sp>
-        <p:nvSpPr>
-          <p:cNvPr id="3" name="TextBox 2">
-            <a:extLst>
-              <a:ext uri="{FF2B5EF4-FFF2-40B4-BE49-F238E27FC236}">
-                <a16:creationId xmlns:a16="http://schemas.microsoft.com/office/drawing/2014/main" id="{970D06AB-77A6-827C-D053-6136DCDB3474}"/>
-              </a:ext>
-            </a:extLst>
-          </p:cNvPr>
-          <p:cNvSpPr txBox="1"/>
-          <p:nvPr/>
-        </p:nvSpPr>
-        <p:spPr>
-          <a:xfrm>
-            <a:off x="285498" y="5617520"/>
-            <a:ext cx="2484016" cy="369332"/>
-          </a:xfrm>
-          <a:prstGeom prst="rect">
-            <a:avLst/>
-          </a:prstGeom>
-          <a:noFill/>
-        </p:spPr>
-        <p:txBody>
-          <a:bodyPr wrap="square" rtlCol="0">
-            <a:spAutoFit/>
-          </a:bodyPr>
-          <a:lstStyle/>
-          <a:p>
-            <a:r>
-              <a:rPr lang="en-US" i="1" dirty="0"/>
-              <a:t>Competition Site</a:t>
-            </a:r>
-          </a:p>
-        </p:txBody>
-      </p:sp>
-      <p:sp>
-        <p:nvSpPr>
-          <p:cNvPr id="5" name="TextBox 4">
-            <a:extLst>
-              <a:ext uri="{FF2B5EF4-FFF2-40B4-BE49-F238E27FC236}">
-                <a16:creationId xmlns:a16="http://schemas.microsoft.com/office/drawing/2014/main" id="{E88597B3-9330-A16B-795F-4C465CAEF8C9}"/>
-              </a:ext>
-            </a:extLst>
-          </p:cNvPr>
-          <p:cNvSpPr txBox="1"/>
-          <p:nvPr/>
-        </p:nvSpPr>
-        <p:spPr>
-          <a:xfrm>
-            <a:off x="809016" y="2460195"/>
-            <a:ext cx="1110898" cy="369332"/>
-          </a:xfrm>
-          <a:prstGeom prst="rect">
-            <a:avLst/>
-          </a:prstGeom>
-          <a:noFill/>
-        </p:spPr>
-        <p:txBody>
-          <a:bodyPr wrap="square">
-            <a:spAutoFit/>
-          </a:bodyPr>
-          <a:lstStyle/>
-          <a:p>
-            <a:r>
-              <a:rPr lang="en-US" dirty="0"/>
-              <a:t>Referees</a:t>
-            </a:r>
-            <a:endParaRPr lang="en-CA" dirty="0"/>
-          </a:p>
-        </p:txBody>
-      </p:sp>
-      <p:sp>
-        <p:nvSpPr>
-          <p:cNvPr id="8" name="TextBox 7">
-            <a:extLst>
-              <a:ext uri="{FF2B5EF4-FFF2-40B4-BE49-F238E27FC236}">
-                <a16:creationId xmlns:a16="http://schemas.microsoft.com/office/drawing/2014/main" id="{3804DF01-C511-ED65-9989-F44F7AB2163E}"/>
-              </a:ext>
-            </a:extLst>
-          </p:cNvPr>
-          <p:cNvSpPr txBox="1"/>
-          <p:nvPr/>
-        </p:nvSpPr>
-        <p:spPr>
-          <a:xfrm>
-            <a:off x="2798349" y="4375468"/>
-            <a:ext cx="895502" cy="369332"/>
-          </a:xfrm>
-          <a:prstGeom prst="rect">
-            <a:avLst/>
-          </a:prstGeom>
-          <a:noFill/>
-        </p:spPr>
-        <p:txBody>
-          <a:bodyPr wrap="none" rtlCol="0">
-            <a:spAutoFit/>
-          </a:bodyPr>
-          <a:lstStyle/>
-          <a:p>
-            <a:r>
-              <a:rPr lang="en-US" dirty="0"/>
-              <a:t>owlcms</a:t>
-            </a:r>
-          </a:p>
-        </p:txBody>
-      </p:sp>
-      <p:sp>
-        <p:nvSpPr>
-          <p:cNvPr id="10" name="TextBox 9">
-            <a:extLst>
-              <a:ext uri="{FF2B5EF4-FFF2-40B4-BE49-F238E27FC236}">
-                <a16:creationId xmlns:a16="http://schemas.microsoft.com/office/drawing/2014/main" id="{EF31240E-65D8-199E-85D1-677B4950C62B}"/>
-              </a:ext>
-            </a:extLst>
-          </p:cNvPr>
-          <p:cNvSpPr txBox="1"/>
-          <p:nvPr/>
-        </p:nvSpPr>
-        <p:spPr>
-          <a:xfrm>
-            <a:off x="2642248" y="4665350"/>
-            <a:ext cx="1220206" cy="369332"/>
-          </a:xfrm>
-          <a:prstGeom prst="rect">
-            <a:avLst/>
-          </a:prstGeom>
-          <a:noFill/>
-        </p:spPr>
-        <p:txBody>
-          <a:bodyPr wrap="none" rtlCol="0">
-            <a:spAutoFit/>
-          </a:bodyPr>
-          <a:lstStyle/>
-          <a:p>
-            <a:r>
-              <a:rPr lang="en-US" dirty="0"/>
-              <a:t>Announcer</a:t>
-            </a:r>
-          </a:p>
-        </p:txBody>
-      </p:sp>
-      <p:pic>
-        <p:nvPicPr>
-          <p:cNvPr id="11" name="Graphic 10" descr="Laptop">
-            <a:extLst>
-              <a:ext uri="{FF2B5EF4-FFF2-40B4-BE49-F238E27FC236}">
-                <a16:creationId xmlns:a16="http://schemas.microsoft.com/office/drawing/2014/main" id="{032C1AB0-6E58-5751-7C29-79736D414132}"/>
-              </a:ext>
-            </a:extLst>
-          </p:cNvPr>
-          <p:cNvPicPr>
-            <a:picLocks noChangeAspect="1"/>
-          </p:cNvPicPr>
-          <p:nvPr/>
-        </p:nvPicPr>
-        <p:blipFill>
-          <a:blip r:embed="rId6">
-            <a:extLst>
-              <a:ext uri="{28A0092B-C50C-407E-A947-70E740481C1C}">
-                <a14:useLocalDpi xmlns:a14="http://schemas.microsoft.com/office/drawing/2010/main" val="0"/>
-              </a:ext>
-              <a:ext uri="{96DAC541-7B7A-43D3-8B79-37D633B846F1}">
-                <asvg:svgBlip xmlns:asvg="http://schemas.microsoft.com/office/drawing/2016/SVG/main" r:embed="rId7"/>
-              </a:ext>
-            </a:extLst>
-          </a:blip>
-          <a:stretch>
-            <a:fillRect/>
-          </a:stretch>
-        </p:blipFill>
-        <p:spPr>
-          <a:xfrm>
-            <a:off x="2788900" y="3620508"/>
-            <a:ext cx="914400" cy="914400"/>
-          </a:xfrm>
-          <a:prstGeom prst="rect">
-            <a:avLst/>
-          </a:prstGeom>
-        </p:spPr>
-      </p:pic>
-      <p:sp>
-        <p:nvSpPr>
-          <p:cNvPr id="13" name="Graphic 45" descr="Cloud">
-            <a:extLst>
-              <a:ext uri="{FF2B5EF4-FFF2-40B4-BE49-F238E27FC236}">
-                <a16:creationId xmlns:a16="http://schemas.microsoft.com/office/drawing/2014/main" id="{EBFCEE4E-E549-41A8-11F9-8FE6FCA09358}"/>
-              </a:ext>
-            </a:extLst>
-          </p:cNvPr>
-          <p:cNvSpPr/>
-          <p:nvPr/>
-        </p:nvSpPr>
-        <p:spPr>
-          <a:xfrm>
-            <a:off x="3938911" y="3317027"/>
-            <a:ext cx="2157090" cy="1516225"/>
-          </a:xfrm>
-          <a:custGeom>
-            <a:avLst/>
-            <a:gdLst>
-              <a:gd name="connsiteX0" fmla="*/ 681898 w 4015594"/>
-              <a:gd name="connsiteY0" fmla="*/ 2281741 h 2285550"/>
-              <a:gd name="connsiteX1" fmla="*/ 870545 w 4015594"/>
-              <a:gd name="connsiteY1" fmla="*/ 2285551 h 2285550"/>
-              <a:gd name="connsiteX2" fmla="*/ 3444286 w 4015594"/>
-              <a:gd name="connsiteY2" fmla="*/ 2285551 h 2285550"/>
-              <a:gd name="connsiteX3" fmla="*/ 4015591 w 4015594"/>
-              <a:gd name="connsiteY3" fmla="*/ 1709703 h 2285550"/>
-              <a:gd name="connsiteX4" fmla="*/ 3449048 w 4015594"/>
-              <a:gd name="connsiteY4" fmla="*/ 1138436 h 2285550"/>
-              <a:gd name="connsiteX5" fmla="*/ 3401423 w 4015594"/>
-              <a:gd name="connsiteY5" fmla="*/ 1138436 h 2285550"/>
-              <a:gd name="connsiteX6" fmla="*/ 3101386 w 4015594"/>
-              <a:gd name="connsiteY6" fmla="*/ 557239 h 2285550"/>
-              <a:gd name="connsiteX7" fmla="*/ 2448890 w 4015594"/>
-              <a:gd name="connsiteY7" fmla="*/ 466752 h 2285550"/>
-              <a:gd name="connsiteX8" fmla="*/ 1296117 w 4015594"/>
-              <a:gd name="connsiteY8" fmla="*/ 94148 h 2285550"/>
-              <a:gd name="connsiteX9" fmla="*/ 829559 w 4015594"/>
-              <a:gd name="connsiteY9" fmla="*/ 852610 h 2285550"/>
-              <a:gd name="connsiteX10" fmla="*/ 829559 w 4015594"/>
-              <a:gd name="connsiteY10" fmla="*/ 862135 h 2285550"/>
-              <a:gd name="connsiteX11" fmla="*/ 716535 w 4015594"/>
-              <a:gd name="connsiteY11" fmla="*/ 852929 h 2285550"/>
-              <a:gd name="connsiteX12" fmla="*/ 0 w 4015594"/>
-              <a:gd name="connsiteY12" fmla="*/ 1567799 h 2285550"/>
-              <a:gd name="connsiteX13" fmla="*/ 67507 w 4015594"/>
-              <a:gd name="connsiteY13" fmla="*/ 1872066 h 2285550"/>
-              <a:gd name="connsiteX14" fmla="*/ 681898 w 4015594"/>
-              <a:gd name="connsiteY14" fmla="*/ 2281741 h 2285550"/>
-              <a:gd name="connsiteX15" fmla="*/ 219826 w 4015594"/>
-              <a:gd name="connsiteY15" fmla="*/ 1195710 h 2285550"/>
-              <a:gd name="connsiteX16" fmla="*/ 716507 w 4015594"/>
-              <a:gd name="connsiteY16" fmla="*/ 948169 h 2285550"/>
-              <a:gd name="connsiteX17" fmla="*/ 814138 w 4015594"/>
-              <a:gd name="connsiteY17" fmla="*/ 956118 h 2285550"/>
-              <a:gd name="connsiteX18" fmla="*/ 924776 w 4015594"/>
-              <a:gd name="connsiteY18" fmla="*/ 974215 h 2285550"/>
-              <a:gd name="connsiteX19" fmla="*/ 924776 w 4015594"/>
-              <a:gd name="connsiteY19" fmla="*/ 852591 h 2285550"/>
-              <a:gd name="connsiteX20" fmla="*/ 1690971 w 4015594"/>
-              <a:gd name="connsiteY20" fmla="*/ 95767 h 2285550"/>
-              <a:gd name="connsiteX21" fmla="*/ 2364137 w 4015594"/>
-              <a:gd name="connsiteY21" fmla="*/ 510238 h 2285550"/>
-              <a:gd name="connsiteX22" fmla="*/ 2401960 w 4015594"/>
-              <a:gd name="connsiteY22" fmla="*/ 583909 h 2285550"/>
-              <a:gd name="connsiteX23" fmla="*/ 2480170 w 4015594"/>
-              <a:gd name="connsiteY23" fmla="*/ 556701 h 2285550"/>
-              <a:gd name="connsiteX24" fmla="*/ 3270097 w 4015594"/>
-              <a:gd name="connsiteY24" fmla="*/ 930548 h 2285550"/>
-              <a:gd name="connsiteX25" fmla="*/ 3306169 w 4015594"/>
-              <a:gd name="connsiteY25" fmla="*/ 1138436 h 2285550"/>
-              <a:gd name="connsiteX26" fmla="*/ 3306169 w 4015594"/>
-              <a:gd name="connsiteY26" fmla="*/ 1233686 h 2285550"/>
-              <a:gd name="connsiteX27" fmla="*/ 3449044 w 4015594"/>
-              <a:gd name="connsiteY27" fmla="*/ 1233686 h 2285550"/>
-              <a:gd name="connsiteX28" fmla="*/ 3920293 w 4015594"/>
-              <a:gd name="connsiteY28" fmla="*/ 1719004 h 2285550"/>
-              <a:gd name="connsiteX29" fmla="*/ 3444286 w 4015594"/>
-              <a:gd name="connsiteY29" fmla="*/ 2190301 h 2285550"/>
-              <a:gd name="connsiteX30" fmla="*/ 771947 w 4015594"/>
-              <a:gd name="connsiteY30" fmla="*/ 2190301 h 2285550"/>
-              <a:gd name="connsiteX31" fmla="*/ 687070 w 4015594"/>
-              <a:gd name="connsiteY31" fmla="*/ 2186629 h 2285550"/>
-              <a:gd name="connsiteX32" fmla="*/ 95530 w 4015594"/>
-              <a:gd name="connsiteY32" fmla="*/ 1541782 h 2285550"/>
-              <a:gd name="connsiteX33" fmla="*/ 219811 w 4015594"/>
-              <a:gd name="connsiteY33" fmla="*/ 1195710 h 2285550"/>
-            </a:gdLst>
-            <a:ahLst/>
-            <a:cxnLst>
-              <a:cxn ang="0">
-                <a:pos x="connsiteX0" y="connsiteY0"/>
-              </a:cxn>
-              <a:cxn ang="0">
-                <a:pos x="connsiteX1" y="connsiteY1"/>
-              </a:cxn>
-              <a:cxn ang="0">
-                <a:pos x="connsiteX2" y="connsiteY2"/>
-              </a:cxn>
-              <a:cxn ang="0">
-                <a:pos x="connsiteX3" y="connsiteY3"/>
-              </a:cxn>
-              <a:cxn ang="0">
-                <a:pos x="connsiteX4" y="connsiteY4"/>
-              </a:cxn>
-              <a:cxn ang="0">
-                <a:pos x="connsiteX5" y="connsiteY5"/>
-              </a:cxn>
-              <a:cxn ang="0">
-                <a:pos x="connsiteX6" y="connsiteY6"/>
-              </a:cxn>
-              <a:cxn ang="0">
-                <a:pos x="connsiteX7" y="connsiteY7"/>
-              </a:cxn>
-              <a:cxn ang="0">
-                <a:pos x="connsiteX8" y="connsiteY8"/>
-              </a:cxn>
-              <a:cxn ang="0">
-                <a:pos x="connsiteX9" y="connsiteY9"/>
-              </a:cxn>
-              <a:cxn ang="0">
-                <a:pos x="connsiteX10" y="connsiteY10"/>
-              </a:cxn>
-              <a:cxn ang="0">
-                <a:pos x="connsiteX11" y="connsiteY11"/>
-              </a:cxn>
-              <a:cxn ang="0">
-                <a:pos x="connsiteX12" y="connsiteY12"/>
-              </a:cxn>
-              <a:cxn ang="0">
-                <a:pos x="connsiteX13" y="connsiteY13"/>
-              </a:cxn>
-              <a:cxn ang="0">
-                <a:pos x="connsiteX14" y="connsiteY14"/>
-              </a:cxn>
-              <a:cxn ang="0">
-                <a:pos x="connsiteX15" y="connsiteY15"/>
-              </a:cxn>
-              <a:cxn ang="0">
-                <a:pos x="connsiteX16" y="connsiteY16"/>
-              </a:cxn>
-              <a:cxn ang="0">
-                <a:pos x="connsiteX17" y="connsiteY17"/>
-              </a:cxn>
-              <a:cxn ang="0">
-                <a:pos x="connsiteX18" y="connsiteY18"/>
-              </a:cxn>
-              <a:cxn ang="0">
-                <a:pos x="connsiteX19" y="connsiteY19"/>
-              </a:cxn>
-              <a:cxn ang="0">
-                <a:pos x="connsiteX20" y="connsiteY20"/>
-              </a:cxn>
-              <a:cxn ang="0">
-                <a:pos x="connsiteX21" y="connsiteY21"/>
-              </a:cxn>
-              <a:cxn ang="0">
-                <a:pos x="connsiteX22" y="connsiteY22"/>
-              </a:cxn>
-              <a:cxn ang="0">
-                <a:pos x="connsiteX23" y="connsiteY23"/>
-              </a:cxn>
-              <a:cxn ang="0">
-                <a:pos x="connsiteX24" y="connsiteY24"/>
-              </a:cxn>
-              <a:cxn ang="0">
-                <a:pos x="connsiteX25" y="connsiteY25"/>
-              </a:cxn>
-              <a:cxn ang="0">
-                <a:pos x="connsiteX26" y="connsiteY26"/>
-              </a:cxn>
-              <a:cxn ang="0">
-                <a:pos x="connsiteX27" y="connsiteY27"/>
-              </a:cxn>
-              <a:cxn ang="0">
-                <a:pos x="connsiteX28" y="connsiteY28"/>
-              </a:cxn>
-              <a:cxn ang="0">
-                <a:pos x="connsiteX29" y="connsiteY29"/>
-              </a:cxn>
-              <a:cxn ang="0">
-                <a:pos x="connsiteX30" y="connsiteY30"/>
-              </a:cxn>
-              <a:cxn ang="0">
-                <a:pos x="connsiteX31" y="connsiteY31"/>
-              </a:cxn>
-              <a:cxn ang="0">
-                <a:pos x="connsiteX32" y="connsiteY32"/>
-              </a:cxn>
-              <a:cxn ang="0">
-                <a:pos x="connsiteX33" y="connsiteY33"/>
-              </a:cxn>
-            </a:cxnLst>
-            <a:rect l="l" t="t" r="r" b="b"/>
-            <a:pathLst>
-              <a:path w="4015594" h="2285550">
-                <a:moveTo>
-                  <a:pt x="681898" y="2281741"/>
-                </a:moveTo>
-                <a:cubicBezTo>
-                  <a:pt x="730051" y="2284365"/>
-                  <a:pt x="870545" y="2285551"/>
-                  <a:pt x="870545" y="2285551"/>
-                </a:cubicBezTo>
-                <a:lnTo>
-                  <a:pt x="3444286" y="2285551"/>
-                </a:lnTo>
-                <a:cubicBezTo>
-                  <a:pt x="3761064" y="2284298"/>
-                  <a:pt x="4016848" y="2026480"/>
-                  <a:pt x="4015591" y="1709703"/>
-                </a:cubicBezTo>
-                <a:cubicBezTo>
-                  <a:pt x="4014352" y="1396554"/>
-                  <a:pt x="3762178" y="1142275"/>
-                  <a:pt x="3449048" y="1138436"/>
-                </a:cubicBezTo>
-                <a:lnTo>
-                  <a:pt x="3401423" y="1138436"/>
-                </a:lnTo>
-                <a:cubicBezTo>
-                  <a:pt x="3400980" y="907655"/>
-                  <a:pt x="3289266" y="691256"/>
-                  <a:pt x="3101386" y="557239"/>
-                </a:cubicBezTo>
-                <a:cubicBezTo>
-                  <a:pt x="2911034" y="424056"/>
-                  <a:pt x="2668303" y="390395"/>
-                  <a:pt x="2448890" y="466752"/>
-                </a:cubicBezTo>
-                <a:cubicBezTo>
-                  <a:pt x="2233454" y="45533"/>
-                  <a:pt x="1717337" y="-121288"/>
-                  <a:pt x="1296117" y="94148"/>
-                </a:cubicBezTo>
-                <a:cubicBezTo>
-                  <a:pt x="1011091" y="239928"/>
-                  <a:pt x="831140" y="532470"/>
-                  <a:pt x="829559" y="852610"/>
-                </a:cubicBezTo>
-                <a:lnTo>
-                  <a:pt x="829559" y="862135"/>
-                </a:lnTo>
-                <a:cubicBezTo>
-                  <a:pt x="792192" y="856020"/>
-                  <a:pt x="754397" y="852943"/>
-                  <a:pt x="716535" y="852929"/>
-                </a:cubicBezTo>
-                <a:cubicBezTo>
-                  <a:pt x="321262" y="852472"/>
-                  <a:pt x="460" y="1172531"/>
-                  <a:pt x="0" y="1567799"/>
-                </a:cubicBezTo>
-                <a:cubicBezTo>
-                  <a:pt x="-121" y="1672950"/>
-                  <a:pt x="22927" y="1776835"/>
-                  <a:pt x="67507" y="1872066"/>
-                </a:cubicBezTo>
-                <a:cubicBezTo>
-                  <a:pt x="183202" y="2109633"/>
-                  <a:pt x="418107" y="2266272"/>
-                  <a:pt x="681898" y="2281741"/>
-                </a:cubicBezTo>
-                <a:close/>
-                <a:moveTo>
-                  <a:pt x="219826" y="1195710"/>
-                </a:moveTo>
-                <a:cubicBezTo>
-                  <a:pt x="338650" y="1041376"/>
-                  <a:pt x="521740" y="950122"/>
-                  <a:pt x="716507" y="948169"/>
-                </a:cubicBezTo>
-                <a:cubicBezTo>
-                  <a:pt x="749211" y="948198"/>
-                  <a:pt x="781858" y="950855"/>
-                  <a:pt x="814138" y="956118"/>
-                </a:cubicBezTo>
-                <a:lnTo>
-                  <a:pt x="924776" y="974215"/>
-                </a:lnTo>
-                <a:lnTo>
-                  <a:pt x="924776" y="852591"/>
-                </a:lnTo>
-                <a:cubicBezTo>
-                  <a:pt x="927362" y="432019"/>
-                  <a:pt x="1270400" y="93181"/>
-                  <a:pt x="1690971" y="95767"/>
-                </a:cubicBezTo>
-                <a:cubicBezTo>
-                  <a:pt x="1975112" y="97515"/>
-                  <a:pt x="2234644" y="257311"/>
-                  <a:pt x="2364137" y="510238"/>
-                </a:cubicBezTo>
-                <a:lnTo>
-                  <a:pt x="2401960" y="583909"/>
-                </a:lnTo>
-                <a:lnTo>
-                  <a:pt x="2480170" y="556701"/>
-                </a:lnTo>
-                <a:cubicBezTo>
-                  <a:pt x="2801539" y="441806"/>
-                  <a:pt x="3155197" y="609179"/>
-                  <a:pt x="3270097" y="930548"/>
-                </a:cubicBezTo>
-                <a:cubicBezTo>
-                  <a:pt x="3293948" y="997261"/>
-                  <a:pt x="3306149" y="1067584"/>
-                  <a:pt x="3306169" y="1138436"/>
-                </a:cubicBezTo>
-                <a:lnTo>
-                  <a:pt x="3306169" y="1233686"/>
-                </a:lnTo>
-                <a:lnTo>
-                  <a:pt x="3449044" y="1233686"/>
-                </a:lnTo>
-                <a:cubicBezTo>
-                  <a:pt x="3713191" y="1237572"/>
-                  <a:pt x="3924179" y="1454856"/>
-                  <a:pt x="3920293" y="1719004"/>
-                </a:cubicBezTo>
-                <a:cubicBezTo>
-                  <a:pt x="3916459" y="1979527"/>
-                  <a:pt x="3704833" y="2189062"/>
-                  <a:pt x="3444286" y="2190301"/>
-                </a:cubicBezTo>
-                <a:lnTo>
-                  <a:pt x="771947" y="2190301"/>
-                </a:lnTo>
-                <a:lnTo>
-                  <a:pt x="687070" y="2186629"/>
-                </a:lnTo>
-                <a:cubicBezTo>
-                  <a:pt x="345651" y="2171908"/>
-                  <a:pt x="80810" y="1883200"/>
-                  <a:pt x="95530" y="1541782"/>
-                </a:cubicBezTo>
-                <a:cubicBezTo>
-                  <a:pt x="100932" y="1416495"/>
-                  <a:pt x="144273" y="1295808"/>
-                  <a:pt x="219811" y="1195710"/>
-                </a:cubicBezTo>
-                <a:close/>
-              </a:path>
-            </a:pathLst>
-          </a:custGeom>
-          <a:noFill/>
-          <a:ln w="6350" cap="flat">
-            <a:solidFill>
-              <a:schemeClr val="accent1"/>
-            </a:solidFill>
-            <a:prstDash val="solid"/>
-            <a:miter/>
-          </a:ln>
-        </p:spPr>
-        <p:txBody>
-          <a:bodyPr rtlCol="0" anchor="ctr"/>
-          <a:lstStyle/>
-          <a:p>
-            <a:endParaRPr lang="en-US" dirty="0"/>
-          </a:p>
-        </p:txBody>
-      </p:sp>
       <p:pic>
         <p:nvPicPr>
           <p:cNvPr id="14" name="Graphic 13" descr="Laptop">

</xml_diff>